<commit_message>
completed ERD image started readme file
</commit_message>
<xml_diff>
--- a/your-project/ERD - in progress.pptx
+++ b/your-project/ERD - in progress.pptx
@@ -6,6 +6,7 @@
   </p:sldMasterIdLst>
   <p:sldIdLst>
     <p:sldId id="256" r:id="rId2"/>
+    <p:sldId id="258" r:id="rId3"/>
   </p:sldIdLst>
   <p:sldSz cx="12192000" cy="6858000"/>
   <p:notesSz cx="6858000" cy="9144000"/>
@@ -104,6 +105,11 @@
       </a:defRPr>
     </a:lvl9pPr>
   </p:defaultTextStyle>
+  <p:extLst>
+    <p:ext uri="{EFAFB233-063F-42B5-8137-9DF3F51BA10A}">
+      <p15:sldGuideLst xmlns:p15="http://schemas.microsoft.com/office/powerpoint/2012/main"/>
+    </p:ext>
+  </p:extLst>
 </p:presentation>
 </file>
 
@@ -3357,13 +3363,13 @@
           <p:nvPr>
             <p:extLst>
               <p:ext uri="{D42A27DB-BD31-4B8C-83A1-F6EECF244321}">
-                <p14:modId xmlns:p14="http://schemas.microsoft.com/office/powerpoint/2010/main" val="1254000058"/>
+                <p14:modId xmlns:p14="http://schemas.microsoft.com/office/powerpoint/2010/main" val="3914252717"/>
               </p:ext>
             </p:extLst>
           </p:nvPr>
         </p:nvGraphicFramePr>
         <p:xfrm>
-          <a:off x="759012" y="1114113"/>
+          <a:off x="7234519" y="4200508"/>
           <a:ext cx="3104776" cy="1854200"/>
         </p:xfrm>
         <a:graphic>
@@ -3389,7 +3395,7 @@
                     <a:p>
                       <a:r>
                         <a:rPr lang="en-AU" dirty="0"/>
-                        <a:t>streets</a:t>
+                        <a:t>street</a:t>
                       </a:r>
                     </a:p>
                   </a:txBody>
@@ -3536,10 +3542,10 @@
       </p:graphicFrame>
       <p:graphicFrame>
         <p:nvGraphicFramePr>
-          <p:cNvPr id="7" name="Table 4">
-            <a:extLst>
-              <a:ext uri="{FF2B5EF4-FFF2-40B4-BE49-F238E27FC236}">
-                <a16:creationId xmlns:a16="http://schemas.microsoft.com/office/drawing/2014/main" id="{FE1BDFB3-C193-42C7-968F-B07C9E9FC540}"/>
+          <p:cNvPr id="9" name="Table 4">
+            <a:extLst>
+              <a:ext uri="{FF2B5EF4-FFF2-40B4-BE49-F238E27FC236}">
+                <a16:creationId xmlns:a16="http://schemas.microsoft.com/office/drawing/2014/main" id="{6E736901-8F3A-4316-81B8-5840FE240004}"/>
               </a:ext>
             </a:extLst>
           </p:cNvPr>
@@ -3549,13 +3555,1136 @@
           <p:nvPr>
             <p:extLst>
               <p:ext uri="{D42A27DB-BD31-4B8C-83A1-F6EECF244321}">
-                <p14:modId xmlns:p14="http://schemas.microsoft.com/office/powerpoint/2010/main" val="542107658"/>
+                <p14:modId xmlns:p14="http://schemas.microsoft.com/office/powerpoint/2010/main" val="3272351239"/>
               </p:ext>
             </p:extLst>
           </p:nvPr>
         </p:nvGraphicFramePr>
         <p:xfrm>
-          <a:off x="4543612" y="1114113"/>
+          <a:off x="1783977" y="3839828"/>
+          <a:ext cx="3104776" cy="2214880"/>
+        </p:xfrm>
+        <a:graphic>
+          <a:graphicData uri="http://schemas.openxmlformats.org/drawingml/2006/table">
+            <a:tbl>
+              <a:tblPr firstRow="1" bandRow="1">
+                <a:tableStyleId>{5C22544A-7EE6-4342-B048-85BDC9FD1C3A}</a:tableStyleId>
+              </a:tblPr>
+              <a:tblGrid>
+                <a:gridCol w="3104776">
+                  <a:extLst>
+                    <a:ext uri="{9D8B030D-6E8A-4147-A177-3AD203B41FA5}">
+                      <a16:colId xmlns:a16="http://schemas.microsoft.com/office/drawing/2014/main" val="1003031443"/>
+                    </a:ext>
+                  </a:extLst>
+                </a:gridCol>
+              </a:tblGrid>
+              <a:tr h="370840">
+                <a:tc>
+                  <a:txBody>
+                    <a:bodyPr/>
+                    <a:lstStyle/>
+                    <a:p>
+                      <a:r>
+                        <a:rPr lang="en-AU" dirty="0" err="1"/>
+                        <a:t>accident_datetime</a:t>
+                      </a:r>
+                      <a:endParaRPr lang="en-AU" dirty="0"/>
+                    </a:p>
+                  </a:txBody>
+                  <a:tcPr/>
+                </a:tc>
+                <a:extLst>
+                  <a:ext uri="{0D108BD9-81ED-4DB2-BD59-A6C34878D82A}">
+                    <a16:rowId xmlns:a16="http://schemas.microsoft.com/office/drawing/2014/main" val="2026449852"/>
+                  </a:ext>
+                </a:extLst>
+              </a:tr>
+              <a:tr h="370840">
+                <a:tc>
+                  <a:txBody>
+                    <a:bodyPr/>
+                    <a:lstStyle/>
+                    <a:p>
+                      <a:pPr marL="0" marR="0" lvl="0" indent="0" algn="l" defTabSz="914400" rtl="0" eaLnBrk="1" fontAlgn="auto" latinLnBrk="0" hangingPunct="1">
+                        <a:lnSpc>
+                          <a:spcPct val="100000"/>
+                        </a:lnSpc>
+                        <a:spcBef>
+                          <a:spcPts val="0"/>
+                        </a:spcBef>
+                        <a:spcAft>
+                          <a:spcPts val="0"/>
+                        </a:spcAft>
+                        <a:buClrTx/>
+                        <a:buSzTx/>
+                        <a:buFontTx/>
+                        <a:buNone/>
+                        <a:tabLst/>
+                        <a:defRPr/>
+                      </a:pPr>
+                      <a:r>
+                        <a:rPr lang="en-AU" b="1" dirty="0" err="1"/>
+                        <a:t>accident_id</a:t>
+                      </a:r>
+                      <a:r>
+                        <a:rPr lang="en-AU" b="1" dirty="0"/>
+                        <a:t> (</a:t>
+                      </a:r>
+                      <a:r>
+                        <a:rPr lang="en-AU" b="1" dirty="0" err="1"/>
+                        <a:t>Codi_expedient</a:t>
+                      </a:r>
+                      <a:r>
+                        <a:rPr lang="en-AU" b="1" dirty="0"/>
+                        <a:t>)</a:t>
+                      </a:r>
+                    </a:p>
+                  </a:txBody>
+                  <a:tcPr/>
+                </a:tc>
+                <a:extLst>
+                  <a:ext uri="{0D108BD9-81ED-4DB2-BD59-A6C34878D82A}">
+                    <a16:rowId xmlns:a16="http://schemas.microsoft.com/office/drawing/2014/main" val="3237917299"/>
+                  </a:ext>
+                </a:extLst>
+              </a:tr>
+              <a:tr h="320040">
+                <a:tc>
+                  <a:txBody>
+                    <a:bodyPr/>
+                    <a:lstStyle/>
+                    <a:p>
+                      <a:pPr marL="0" marR="0" lvl="0" indent="0" algn="l" defTabSz="914400" rtl="0" eaLnBrk="1" fontAlgn="auto" latinLnBrk="0" hangingPunct="1">
+                        <a:lnSpc>
+                          <a:spcPct val="100000"/>
+                        </a:lnSpc>
+                        <a:spcBef>
+                          <a:spcPts val="0"/>
+                        </a:spcBef>
+                        <a:spcAft>
+                          <a:spcPts val="0"/>
+                        </a:spcAft>
+                        <a:buClrTx/>
+                        <a:buSzTx/>
+                        <a:buFontTx/>
+                        <a:buNone/>
+                        <a:tabLst/>
+                        <a:defRPr/>
+                      </a:pPr>
+                      <a:r>
+                        <a:rPr lang="es-ES" dirty="0" err="1"/>
+                        <a:t>hour</a:t>
+                      </a:r>
+                      <a:r>
+                        <a:rPr lang="es-ES" dirty="0"/>
+                        <a:t> (</a:t>
+                      </a:r>
+                      <a:r>
+                        <a:rPr lang="es-ES" dirty="0" err="1"/>
+                        <a:t>Hoa_dia</a:t>
+                      </a:r>
+                      <a:r>
+                        <a:rPr lang="es-ES" dirty="0"/>
+                        <a:t>)</a:t>
+                      </a:r>
+                    </a:p>
+                  </a:txBody>
+                  <a:tcPr/>
+                </a:tc>
+                <a:extLst>
+                  <a:ext uri="{0D108BD9-81ED-4DB2-BD59-A6C34878D82A}">
+                    <a16:rowId xmlns:a16="http://schemas.microsoft.com/office/drawing/2014/main" val="1184570764"/>
+                  </a:ext>
+                </a:extLst>
+              </a:tr>
+              <a:tr h="320040">
+                <a:tc>
+                  <a:txBody>
+                    <a:bodyPr/>
+                    <a:lstStyle/>
+                    <a:p>
+                      <a:pPr marL="0" marR="0" lvl="0" indent="0" algn="l" defTabSz="914400" rtl="0" eaLnBrk="1" fontAlgn="auto" latinLnBrk="0" hangingPunct="1">
+                        <a:lnSpc>
+                          <a:spcPct val="100000"/>
+                        </a:lnSpc>
+                        <a:spcBef>
+                          <a:spcPts val="0"/>
+                        </a:spcBef>
+                        <a:spcAft>
+                          <a:spcPts val="0"/>
+                        </a:spcAft>
+                        <a:buClrTx/>
+                        <a:buSzTx/>
+                        <a:buFontTx/>
+                        <a:buNone/>
+                        <a:tabLst/>
+                        <a:defRPr/>
+                      </a:pPr>
+                      <a:r>
+                        <a:rPr lang="es-ES" dirty="0" err="1"/>
+                        <a:t>day</a:t>
+                      </a:r>
+                      <a:r>
+                        <a:rPr lang="es-ES" dirty="0"/>
+                        <a:t> (</a:t>
+                      </a:r>
+                      <a:r>
+                        <a:rPr lang="es-ES" dirty="0" err="1"/>
+                        <a:t>Dia_mes</a:t>
+                      </a:r>
+                      <a:r>
+                        <a:rPr lang="es-ES" dirty="0"/>
+                        <a:t>)</a:t>
+                      </a:r>
+                    </a:p>
+                  </a:txBody>
+                  <a:tcPr/>
+                </a:tc>
+                <a:extLst>
+                  <a:ext uri="{0D108BD9-81ED-4DB2-BD59-A6C34878D82A}">
+                    <a16:rowId xmlns:a16="http://schemas.microsoft.com/office/drawing/2014/main" val="2101100313"/>
+                  </a:ext>
+                </a:extLst>
+              </a:tr>
+              <a:tr h="370840">
+                <a:tc>
+                  <a:txBody>
+                    <a:bodyPr/>
+                    <a:lstStyle/>
+                    <a:p>
+                      <a:pPr marL="0" marR="0" lvl="0" indent="0" algn="l" defTabSz="914400" rtl="0" eaLnBrk="1" fontAlgn="auto" latinLnBrk="0" hangingPunct="1">
+                        <a:lnSpc>
+                          <a:spcPct val="100000"/>
+                        </a:lnSpc>
+                        <a:spcBef>
+                          <a:spcPts val="0"/>
+                        </a:spcBef>
+                        <a:spcAft>
+                          <a:spcPts val="0"/>
+                        </a:spcAft>
+                        <a:buClrTx/>
+                        <a:buSzTx/>
+                        <a:buFontTx/>
+                        <a:buNone/>
+                        <a:tabLst/>
+                        <a:defRPr/>
+                      </a:pPr>
+                      <a:r>
+                        <a:rPr lang="es-ES" dirty="0" err="1"/>
+                        <a:t>month</a:t>
+                      </a:r>
+                      <a:r>
+                        <a:rPr lang="es-ES" dirty="0"/>
+                        <a:t> (</a:t>
+                      </a:r>
+                      <a:r>
+                        <a:rPr lang="es-ES" dirty="0" err="1"/>
+                        <a:t>Mes_any</a:t>
+                      </a:r>
+                      <a:r>
+                        <a:rPr lang="es-ES" dirty="0"/>
+                        <a:t>)</a:t>
+                      </a:r>
+                    </a:p>
+                  </a:txBody>
+                  <a:tcPr/>
+                </a:tc>
+                <a:extLst>
+                  <a:ext uri="{0D108BD9-81ED-4DB2-BD59-A6C34878D82A}">
+                    <a16:rowId xmlns:a16="http://schemas.microsoft.com/office/drawing/2014/main" val="2446308387"/>
+                  </a:ext>
+                </a:extLst>
+              </a:tr>
+              <a:tr h="370840">
+                <a:tc>
+                  <a:txBody>
+                    <a:bodyPr/>
+                    <a:lstStyle/>
+                    <a:p>
+                      <a:r>
+                        <a:rPr lang="es-ES" dirty="0" err="1"/>
+                        <a:t>year</a:t>
+                      </a:r>
+                      <a:r>
+                        <a:rPr lang="es-ES" dirty="0"/>
+                        <a:t> (</a:t>
+                      </a:r>
+                      <a:r>
+                        <a:rPr lang="es-ES" dirty="0" err="1"/>
+                        <a:t>Any</a:t>
+                      </a:r>
+                      <a:r>
+                        <a:rPr lang="es-ES" dirty="0"/>
+                        <a:t>)</a:t>
+                      </a:r>
+                      <a:endParaRPr lang="en-AU" dirty="0"/>
+                    </a:p>
+                  </a:txBody>
+                  <a:tcPr/>
+                </a:tc>
+                <a:extLst>
+                  <a:ext uri="{0D108BD9-81ED-4DB2-BD59-A6C34878D82A}">
+                    <a16:rowId xmlns:a16="http://schemas.microsoft.com/office/drawing/2014/main" val="3257835866"/>
+                  </a:ext>
+                </a:extLst>
+              </a:tr>
+            </a:tbl>
+          </a:graphicData>
+        </a:graphic>
+      </p:graphicFrame>
+      <p:graphicFrame>
+        <p:nvGraphicFramePr>
+          <p:cNvPr id="6" name="Table 4">
+            <a:extLst>
+              <a:ext uri="{FF2B5EF4-FFF2-40B4-BE49-F238E27FC236}">
+                <a16:creationId xmlns:a16="http://schemas.microsoft.com/office/drawing/2014/main" id="{C576A95B-C689-497E-AA0E-F1D4C406402C}"/>
+              </a:ext>
+            </a:extLst>
+          </p:cNvPr>
+          <p:cNvGraphicFramePr>
+            <a:graphicFrameLocks noGrp="1"/>
+          </p:cNvGraphicFramePr>
+          <p:nvPr>
+            <p:extLst>
+              <p:ext uri="{D42A27DB-BD31-4B8C-83A1-F6EECF244321}">
+                <p14:modId xmlns:p14="http://schemas.microsoft.com/office/powerpoint/2010/main" val="909257423"/>
+              </p:ext>
+            </p:extLst>
+          </p:nvPr>
+        </p:nvGraphicFramePr>
+        <p:xfrm>
+          <a:off x="7234519" y="1683275"/>
+          <a:ext cx="3104776" cy="2214880"/>
+        </p:xfrm>
+        <a:graphic>
+          <a:graphicData uri="http://schemas.openxmlformats.org/drawingml/2006/table">
+            <a:tbl>
+              <a:tblPr firstRow="1" bandRow="1">
+                <a:tableStyleId>{5C22544A-7EE6-4342-B048-85BDC9FD1C3A}</a:tableStyleId>
+              </a:tblPr>
+              <a:tblGrid>
+                <a:gridCol w="3104776">
+                  <a:extLst>
+                    <a:ext uri="{9D8B030D-6E8A-4147-A177-3AD203B41FA5}">
+                      <a16:colId xmlns:a16="http://schemas.microsoft.com/office/drawing/2014/main" val="1003031443"/>
+                    </a:ext>
+                  </a:extLst>
+                </a:gridCol>
+              </a:tblGrid>
+              <a:tr h="370840">
+                <a:tc>
+                  <a:txBody>
+                    <a:bodyPr/>
+                    <a:lstStyle/>
+                    <a:p>
+                      <a:r>
+                        <a:rPr lang="en-AU" dirty="0" err="1"/>
+                        <a:t>accident_location</a:t>
+                      </a:r>
+                      <a:endParaRPr lang="en-AU" dirty="0"/>
+                    </a:p>
+                  </a:txBody>
+                  <a:tcPr/>
+                </a:tc>
+                <a:extLst>
+                  <a:ext uri="{0D108BD9-81ED-4DB2-BD59-A6C34878D82A}">
+                    <a16:rowId xmlns:a16="http://schemas.microsoft.com/office/drawing/2014/main" val="2026449852"/>
+                  </a:ext>
+                </a:extLst>
+              </a:tr>
+              <a:tr h="370840">
+                <a:tc>
+                  <a:txBody>
+                    <a:bodyPr/>
+                    <a:lstStyle/>
+                    <a:p>
+                      <a:pPr marL="0" marR="0" lvl="0" indent="0" algn="l" defTabSz="914400" rtl="0" eaLnBrk="1" fontAlgn="auto" latinLnBrk="0" hangingPunct="1">
+                        <a:lnSpc>
+                          <a:spcPct val="100000"/>
+                        </a:lnSpc>
+                        <a:spcBef>
+                          <a:spcPts val="0"/>
+                        </a:spcBef>
+                        <a:spcAft>
+                          <a:spcPts val="0"/>
+                        </a:spcAft>
+                        <a:buClrTx/>
+                        <a:buSzTx/>
+                        <a:buFontTx/>
+                        <a:buNone/>
+                        <a:tabLst/>
+                        <a:defRPr/>
+                      </a:pPr>
+                      <a:r>
+                        <a:rPr lang="en-AU" b="1" dirty="0" err="1"/>
+                        <a:t>accident_id</a:t>
+                      </a:r>
+                      <a:r>
+                        <a:rPr lang="en-AU" b="1" dirty="0"/>
+                        <a:t> (</a:t>
+                      </a:r>
+                      <a:r>
+                        <a:rPr lang="en-AU" b="1" dirty="0" err="1"/>
+                        <a:t>Codi_expedient</a:t>
+                      </a:r>
+                      <a:r>
+                        <a:rPr lang="en-AU" b="1" dirty="0"/>
+                        <a:t>)</a:t>
+                      </a:r>
+                    </a:p>
+                  </a:txBody>
+                  <a:tcPr/>
+                </a:tc>
+                <a:extLst>
+                  <a:ext uri="{0D108BD9-81ED-4DB2-BD59-A6C34878D82A}">
+                    <a16:rowId xmlns:a16="http://schemas.microsoft.com/office/drawing/2014/main" val="3237917299"/>
+                  </a:ext>
+                </a:extLst>
+              </a:tr>
+              <a:tr h="370840">
+                <a:tc>
+                  <a:txBody>
+                    <a:bodyPr/>
+                    <a:lstStyle/>
+                    <a:p>
+                      <a:r>
+                        <a:rPr lang="es-ES" b="0" dirty="0" err="1"/>
+                        <a:t>X_coord</a:t>
+                      </a:r>
+                      <a:r>
+                        <a:rPr lang="es-ES" b="0" dirty="0"/>
+                        <a:t> (</a:t>
+                      </a:r>
+                      <a:r>
+                        <a:rPr lang="es-ES" b="0" dirty="0" err="1"/>
+                        <a:t>Coordenada_UTM_X</a:t>
+                      </a:r>
+                      <a:r>
+                        <a:rPr lang="es-ES" b="0" dirty="0"/>
+                        <a:t>)</a:t>
+                      </a:r>
+                    </a:p>
+                  </a:txBody>
+                  <a:tcPr/>
+                </a:tc>
+                <a:extLst>
+                  <a:ext uri="{0D108BD9-81ED-4DB2-BD59-A6C34878D82A}">
+                    <a16:rowId xmlns:a16="http://schemas.microsoft.com/office/drawing/2014/main" val="1184570764"/>
+                  </a:ext>
+                </a:extLst>
+              </a:tr>
+              <a:tr h="370840">
+                <a:tc>
+                  <a:txBody>
+                    <a:bodyPr/>
+                    <a:lstStyle/>
+                    <a:p>
+                      <a:pPr marL="0" marR="0" lvl="0" indent="0" algn="l" defTabSz="914400" rtl="0" eaLnBrk="1" fontAlgn="auto" latinLnBrk="0" hangingPunct="1">
+                        <a:lnSpc>
+                          <a:spcPct val="100000"/>
+                        </a:lnSpc>
+                        <a:spcBef>
+                          <a:spcPts val="0"/>
+                        </a:spcBef>
+                        <a:spcAft>
+                          <a:spcPts val="0"/>
+                        </a:spcAft>
+                        <a:buClrTx/>
+                        <a:buSzTx/>
+                        <a:buFontTx/>
+                        <a:buNone/>
+                        <a:tabLst/>
+                        <a:defRPr/>
+                      </a:pPr>
+                      <a:r>
+                        <a:rPr lang="es-ES" b="0" dirty="0" err="1"/>
+                        <a:t>Y_coord</a:t>
+                      </a:r>
+                      <a:r>
+                        <a:rPr lang="es-ES" b="0" dirty="0"/>
+                        <a:t> (</a:t>
+                      </a:r>
+                      <a:r>
+                        <a:rPr lang="es-ES" b="0" dirty="0" err="1"/>
+                        <a:t>Coordenada_UTM_Y</a:t>
+                      </a:r>
+                      <a:r>
+                        <a:rPr lang="es-ES" b="0" dirty="0"/>
+                        <a:t>)</a:t>
+                      </a:r>
+                      <a:endParaRPr lang="en-AU" dirty="0"/>
+                    </a:p>
+                  </a:txBody>
+                  <a:tcPr/>
+                </a:tc>
+                <a:extLst>
+                  <a:ext uri="{0D108BD9-81ED-4DB2-BD59-A6C34878D82A}">
+                    <a16:rowId xmlns:a16="http://schemas.microsoft.com/office/drawing/2014/main" val="2446308387"/>
+                  </a:ext>
+                </a:extLst>
+              </a:tr>
+              <a:tr h="185420">
+                <a:tc>
+                  <a:txBody>
+                    <a:bodyPr/>
+                    <a:lstStyle/>
+                    <a:p>
+                      <a:pPr marL="0" marR="0" lvl="0" indent="0" algn="l" defTabSz="914400" rtl="0" eaLnBrk="1" fontAlgn="auto" latinLnBrk="0" hangingPunct="1">
+                        <a:lnSpc>
+                          <a:spcPct val="100000"/>
+                        </a:lnSpc>
+                        <a:spcBef>
+                          <a:spcPts val="0"/>
+                        </a:spcBef>
+                        <a:spcAft>
+                          <a:spcPts val="0"/>
+                        </a:spcAft>
+                        <a:buClrTx/>
+                        <a:buSzTx/>
+                        <a:buFontTx/>
+                        <a:buNone/>
+                        <a:tabLst/>
+                        <a:defRPr/>
+                      </a:pPr>
+                      <a:r>
+                        <a:rPr lang="es-ES" b="0" dirty="0" err="1"/>
+                        <a:t>longitude</a:t>
+                      </a:r>
+                      <a:r>
+                        <a:rPr lang="es-ES" b="0" dirty="0"/>
+                        <a:t> (Longitud)</a:t>
+                      </a:r>
+                      <a:endParaRPr lang="en-AU" dirty="0"/>
+                    </a:p>
+                  </a:txBody>
+                  <a:tcPr/>
+                </a:tc>
+                <a:extLst>
+                  <a:ext uri="{0D108BD9-81ED-4DB2-BD59-A6C34878D82A}">
+                    <a16:rowId xmlns:a16="http://schemas.microsoft.com/office/drawing/2014/main" val="3257835866"/>
+                  </a:ext>
+                </a:extLst>
+              </a:tr>
+              <a:tr h="185420">
+                <a:tc>
+                  <a:txBody>
+                    <a:bodyPr/>
+                    <a:lstStyle/>
+                    <a:p>
+                      <a:pPr marL="0" marR="0" lvl="0" indent="0" algn="l" defTabSz="914400" rtl="0" eaLnBrk="1" fontAlgn="auto" latinLnBrk="0" hangingPunct="1">
+                        <a:lnSpc>
+                          <a:spcPct val="100000"/>
+                        </a:lnSpc>
+                        <a:spcBef>
+                          <a:spcPts val="0"/>
+                        </a:spcBef>
+                        <a:spcAft>
+                          <a:spcPts val="0"/>
+                        </a:spcAft>
+                        <a:buClrTx/>
+                        <a:buSzTx/>
+                        <a:buFontTx/>
+                        <a:buNone/>
+                        <a:tabLst/>
+                        <a:defRPr/>
+                      </a:pPr>
+                      <a:r>
+                        <a:rPr lang="es-ES" b="0" dirty="0" err="1"/>
+                        <a:t>latitude</a:t>
+                      </a:r>
+                      <a:r>
+                        <a:rPr lang="es-ES" b="0" dirty="0"/>
+                        <a:t> (Latitud</a:t>
+                      </a:r>
+                      <a:r>
+                        <a:rPr lang="en-AU" b="0" dirty="0"/>
+                        <a:t>)</a:t>
+                      </a:r>
+                      <a:endParaRPr lang="en-AU" dirty="0"/>
+                    </a:p>
+                  </a:txBody>
+                  <a:tcPr/>
+                </a:tc>
+                <a:extLst>
+                  <a:ext uri="{0D108BD9-81ED-4DB2-BD59-A6C34878D82A}">
+                    <a16:rowId xmlns:a16="http://schemas.microsoft.com/office/drawing/2014/main" val="3696940409"/>
+                  </a:ext>
+                </a:extLst>
+              </a:tr>
+            </a:tbl>
+          </a:graphicData>
+        </a:graphic>
+      </p:graphicFrame>
+      <p:graphicFrame>
+        <p:nvGraphicFramePr>
+          <p:cNvPr id="2" name="Table 2">
+            <a:extLst>
+              <a:ext uri="{FF2B5EF4-FFF2-40B4-BE49-F238E27FC236}">
+                <a16:creationId xmlns:a16="http://schemas.microsoft.com/office/drawing/2014/main" id="{C4524260-2538-4CAD-819D-644BAB9A9BA4}"/>
+              </a:ext>
+            </a:extLst>
+          </p:cNvPr>
+          <p:cNvGraphicFramePr>
+            <a:graphicFrameLocks noGrp="1"/>
+          </p:cNvGraphicFramePr>
+          <p:nvPr>
+            <p:extLst>
+              <p:ext uri="{D42A27DB-BD31-4B8C-83A1-F6EECF244321}">
+                <p14:modId xmlns:p14="http://schemas.microsoft.com/office/powerpoint/2010/main" val="3469355086"/>
+              </p:ext>
+            </p:extLst>
+          </p:nvPr>
+        </p:nvGraphicFramePr>
+        <p:xfrm>
+          <a:off x="1783977" y="1683275"/>
+          <a:ext cx="3693459" cy="1483360"/>
+        </p:xfrm>
+        <a:graphic>
+          <a:graphicData uri="http://schemas.openxmlformats.org/drawingml/2006/table">
+            <a:tbl>
+              <a:tblPr firstRow="1" bandRow="1">
+                <a:tableStyleId>{5C22544A-7EE6-4342-B048-85BDC9FD1C3A}</a:tableStyleId>
+              </a:tblPr>
+              <a:tblGrid>
+                <a:gridCol w="3693459">
+                  <a:extLst>
+                    <a:ext uri="{9D8B030D-6E8A-4147-A177-3AD203B41FA5}">
+                      <a16:colId xmlns:a16="http://schemas.microsoft.com/office/drawing/2014/main" val="179097989"/>
+                    </a:ext>
+                  </a:extLst>
+                </a:gridCol>
+              </a:tblGrid>
+              <a:tr h="370840">
+                <a:tc>
+                  <a:txBody>
+                    <a:bodyPr/>
+                    <a:lstStyle/>
+                    <a:p>
+                      <a:r>
+                        <a:rPr lang="en-AU" dirty="0"/>
+                        <a:t>accident</a:t>
+                      </a:r>
+                    </a:p>
+                  </a:txBody>
+                  <a:tcPr/>
+                </a:tc>
+                <a:extLst>
+                  <a:ext uri="{0D108BD9-81ED-4DB2-BD59-A6C34878D82A}">
+                    <a16:rowId xmlns:a16="http://schemas.microsoft.com/office/drawing/2014/main" val="3934754049"/>
+                  </a:ext>
+                </a:extLst>
+              </a:tr>
+              <a:tr h="370840">
+                <a:tc>
+                  <a:txBody>
+                    <a:bodyPr/>
+                    <a:lstStyle/>
+                    <a:p>
+                      <a:pPr marL="0" marR="0" lvl="0" indent="0" algn="l" defTabSz="914400" rtl="0" eaLnBrk="1" fontAlgn="auto" latinLnBrk="0" hangingPunct="1">
+                        <a:lnSpc>
+                          <a:spcPct val="100000"/>
+                        </a:lnSpc>
+                        <a:spcBef>
+                          <a:spcPts val="0"/>
+                        </a:spcBef>
+                        <a:spcAft>
+                          <a:spcPts val="0"/>
+                        </a:spcAft>
+                        <a:buClrTx/>
+                        <a:buSzTx/>
+                        <a:buFontTx/>
+                        <a:buNone/>
+                        <a:tabLst/>
+                        <a:defRPr/>
+                      </a:pPr>
+                      <a:r>
+                        <a:rPr lang="en-AU" b="1" dirty="0" err="1"/>
+                        <a:t>accident_id</a:t>
+                      </a:r>
+                      <a:r>
+                        <a:rPr lang="en-AU" b="1" dirty="0"/>
+                        <a:t> (</a:t>
+                      </a:r>
+                      <a:r>
+                        <a:rPr lang="en-AU" b="1" dirty="0" err="1"/>
+                        <a:t>Codi_expedient</a:t>
+                      </a:r>
+                      <a:r>
+                        <a:rPr lang="en-AU" b="1" dirty="0"/>
+                        <a:t>)</a:t>
+                      </a:r>
+                    </a:p>
+                  </a:txBody>
+                  <a:tcPr/>
+                </a:tc>
+                <a:extLst>
+                  <a:ext uri="{0D108BD9-81ED-4DB2-BD59-A6C34878D82A}">
+                    <a16:rowId xmlns:a16="http://schemas.microsoft.com/office/drawing/2014/main" val="379520170"/>
+                  </a:ext>
+                </a:extLst>
+              </a:tr>
+              <a:tr h="370840">
+                <a:tc>
+                  <a:txBody>
+                    <a:bodyPr/>
+                    <a:lstStyle/>
+                    <a:p>
+                      <a:pPr marL="0" marR="0" lvl="0" indent="0" algn="l" defTabSz="914400" rtl="0" eaLnBrk="1" fontAlgn="auto" latinLnBrk="0" hangingPunct="1">
+                        <a:lnSpc>
+                          <a:spcPct val="100000"/>
+                        </a:lnSpc>
+                        <a:spcBef>
+                          <a:spcPts val="0"/>
+                        </a:spcBef>
+                        <a:spcAft>
+                          <a:spcPts val="0"/>
+                        </a:spcAft>
+                        <a:buClrTx/>
+                        <a:buSzTx/>
+                        <a:buFontTx/>
+                        <a:buNone/>
+                        <a:tabLst/>
+                        <a:defRPr/>
+                      </a:pPr>
+                      <a:r>
+                        <a:rPr lang="en-AU" b="0" dirty="0" err="1"/>
+                        <a:t>street_ID</a:t>
+                      </a:r>
+                      <a:r>
+                        <a:rPr lang="en-AU" b="0" dirty="0"/>
+                        <a:t> (</a:t>
+                      </a:r>
+                      <a:r>
+                        <a:rPr lang="fr-FR" b="0" dirty="0" err="1"/>
+                        <a:t>Codi_carrer</a:t>
+                      </a:r>
+                      <a:r>
+                        <a:rPr lang="fr-FR" b="0" dirty="0"/>
+                        <a:t>)</a:t>
+                      </a:r>
+                      <a:endParaRPr lang="en-AU" b="0" dirty="0"/>
+                    </a:p>
+                  </a:txBody>
+                  <a:tcPr/>
+                </a:tc>
+                <a:extLst>
+                  <a:ext uri="{0D108BD9-81ED-4DB2-BD59-A6C34878D82A}">
+                    <a16:rowId xmlns:a16="http://schemas.microsoft.com/office/drawing/2014/main" val="3515270600"/>
+                  </a:ext>
+                </a:extLst>
+              </a:tr>
+              <a:tr h="370840">
+                <a:tc>
+                  <a:txBody>
+                    <a:bodyPr/>
+                    <a:lstStyle/>
+                    <a:p>
+                      <a:pPr marL="0" marR="0" lvl="0" indent="0" algn="l" defTabSz="914400" rtl="0" eaLnBrk="1" fontAlgn="auto" latinLnBrk="0" hangingPunct="1">
+                        <a:lnSpc>
+                          <a:spcPct val="100000"/>
+                        </a:lnSpc>
+                        <a:spcBef>
+                          <a:spcPts val="0"/>
+                        </a:spcBef>
+                        <a:spcAft>
+                          <a:spcPts val="0"/>
+                        </a:spcAft>
+                        <a:buClrTx/>
+                        <a:buSzTx/>
+                        <a:buFontTx/>
+                        <a:buNone/>
+                        <a:tabLst/>
+                        <a:defRPr/>
+                      </a:pPr>
+                      <a:r>
+                        <a:rPr lang="en-AU" dirty="0" err="1"/>
+                        <a:t>acc_desc</a:t>
+                      </a:r>
+                      <a:r>
+                        <a:rPr lang="en-AU" dirty="0"/>
+                        <a:t> (</a:t>
+                      </a:r>
+                      <a:r>
+                        <a:rPr lang="en-AU" dirty="0" err="1"/>
+                        <a:t>Descripcio_causa_vianant</a:t>
+                      </a:r>
+                      <a:r>
+                        <a:rPr lang="en-AU" dirty="0"/>
+                        <a:t>)</a:t>
+                      </a:r>
+                    </a:p>
+                  </a:txBody>
+                  <a:tcPr/>
+                </a:tc>
+                <a:extLst>
+                  <a:ext uri="{0D108BD9-81ED-4DB2-BD59-A6C34878D82A}">
+                    <a16:rowId xmlns:a16="http://schemas.microsoft.com/office/drawing/2014/main" val="849158257"/>
+                  </a:ext>
+                </a:extLst>
+              </a:tr>
+            </a:tbl>
+          </a:graphicData>
+        </a:graphic>
+      </p:graphicFrame>
+      <p:cxnSp>
+        <p:nvCxnSpPr>
+          <p:cNvPr id="13" name="Straight Connector 12">
+            <a:extLst>
+              <a:ext uri="{FF2B5EF4-FFF2-40B4-BE49-F238E27FC236}">
+                <a16:creationId xmlns:a16="http://schemas.microsoft.com/office/drawing/2014/main" id="{E66D8512-B802-4D57-8436-479B7110D33B}"/>
+              </a:ext>
+            </a:extLst>
+          </p:cNvPr>
+          <p:cNvCxnSpPr/>
+          <p:nvPr/>
+        </p:nvCxnSpPr>
+        <p:spPr>
+          <a:xfrm flipH="1">
+            <a:off x="1138519" y="2232214"/>
+            <a:ext cx="645458" cy="0"/>
+          </a:xfrm>
+          <a:prstGeom prst="line">
+            <a:avLst/>
+          </a:prstGeom>
+        </p:spPr>
+        <p:style>
+          <a:lnRef idx="1">
+            <a:schemeClr val="accent1"/>
+          </a:lnRef>
+          <a:fillRef idx="0">
+            <a:schemeClr val="accent1"/>
+          </a:fillRef>
+          <a:effectRef idx="0">
+            <a:schemeClr val="accent1"/>
+          </a:effectRef>
+          <a:fontRef idx="minor">
+            <a:schemeClr val="tx1"/>
+          </a:fontRef>
+        </p:style>
+      </p:cxnSp>
+      <p:cxnSp>
+        <p:nvCxnSpPr>
+          <p:cNvPr id="15" name="Straight Connector 14">
+            <a:extLst>
+              <a:ext uri="{FF2B5EF4-FFF2-40B4-BE49-F238E27FC236}">
+                <a16:creationId xmlns:a16="http://schemas.microsoft.com/office/drawing/2014/main" id="{CD0762AE-999F-43A2-B2AE-227E15FA7C6F}"/>
+              </a:ext>
+            </a:extLst>
+          </p:cNvPr>
+          <p:cNvCxnSpPr>
+            <a:cxnSpLocks/>
+          </p:cNvCxnSpPr>
+          <p:nvPr/>
+        </p:nvCxnSpPr>
+        <p:spPr>
+          <a:xfrm flipV="1">
+            <a:off x="1138519" y="2232217"/>
+            <a:ext cx="0" cy="2156013"/>
+          </a:xfrm>
+          <a:prstGeom prst="line">
+            <a:avLst/>
+          </a:prstGeom>
+        </p:spPr>
+        <p:style>
+          <a:lnRef idx="1">
+            <a:schemeClr val="accent1"/>
+          </a:lnRef>
+          <a:fillRef idx="0">
+            <a:schemeClr val="accent1"/>
+          </a:fillRef>
+          <a:effectRef idx="0">
+            <a:schemeClr val="accent1"/>
+          </a:effectRef>
+          <a:fontRef idx="minor">
+            <a:schemeClr val="tx1"/>
+          </a:fontRef>
+        </p:style>
+      </p:cxnSp>
+      <p:cxnSp>
+        <p:nvCxnSpPr>
+          <p:cNvPr id="24" name="Straight Arrow Connector 23">
+            <a:extLst>
+              <a:ext uri="{FF2B5EF4-FFF2-40B4-BE49-F238E27FC236}">
+                <a16:creationId xmlns:a16="http://schemas.microsoft.com/office/drawing/2014/main" id="{C074F5FB-741F-4B23-807F-0C5267CAD238}"/>
+              </a:ext>
+            </a:extLst>
+          </p:cNvPr>
+          <p:cNvCxnSpPr/>
+          <p:nvPr/>
+        </p:nvCxnSpPr>
+        <p:spPr>
+          <a:xfrm>
+            <a:off x="1138519" y="4388230"/>
+            <a:ext cx="645458" cy="0"/>
+          </a:xfrm>
+          <a:prstGeom prst="straightConnector1">
+            <a:avLst/>
+          </a:prstGeom>
+          <a:ln>
+            <a:tailEnd type="triangle"/>
+          </a:ln>
+        </p:spPr>
+        <p:style>
+          <a:lnRef idx="1">
+            <a:schemeClr val="accent1"/>
+          </a:lnRef>
+          <a:fillRef idx="0">
+            <a:schemeClr val="accent1"/>
+          </a:fillRef>
+          <a:effectRef idx="0">
+            <a:schemeClr val="accent1"/>
+          </a:effectRef>
+          <a:fontRef idx="minor">
+            <a:schemeClr val="tx1"/>
+          </a:fontRef>
+        </p:style>
+      </p:cxnSp>
+      <p:cxnSp>
+        <p:nvCxnSpPr>
+          <p:cNvPr id="27" name="Straight Connector 26">
+            <a:extLst>
+              <a:ext uri="{FF2B5EF4-FFF2-40B4-BE49-F238E27FC236}">
+                <a16:creationId xmlns:a16="http://schemas.microsoft.com/office/drawing/2014/main" id="{2612CE9B-4D5F-4FB4-B866-8199A2F8E67A}"/>
+              </a:ext>
+            </a:extLst>
+          </p:cNvPr>
+          <p:cNvCxnSpPr/>
+          <p:nvPr/>
+        </p:nvCxnSpPr>
+        <p:spPr>
+          <a:xfrm>
+            <a:off x="5477436" y="2599767"/>
+            <a:ext cx="672354" cy="0"/>
+          </a:xfrm>
+          <a:prstGeom prst="line">
+            <a:avLst/>
+          </a:prstGeom>
+        </p:spPr>
+        <p:style>
+          <a:lnRef idx="1">
+            <a:schemeClr val="accent1"/>
+          </a:lnRef>
+          <a:fillRef idx="0">
+            <a:schemeClr val="accent1"/>
+          </a:fillRef>
+          <a:effectRef idx="0">
+            <a:schemeClr val="accent1"/>
+          </a:effectRef>
+          <a:fontRef idx="minor">
+            <a:schemeClr val="tx1"/>
+          </a:fontRef>
+        </p:style>
+      </p:cxnSp>
+      <p:cxnSp>
+        <p:nvCxnSpPr>
+          <p:cNvPr id="29" name="Straight Arrow Connector 28">
+            <a:extLst>
+              <a:ext uri="{FF2B5EF4-FFF2-40B4-BE49-F238E27FC236}">
+                <a16:creationId xmlns:a16="http://schemas.microsoft.com/office/drawing/2014/main" id="{B1F27FEF-40F5-4807-9C54-F3228D5BCF5A}"/>
+              </a:ext>
+            </a:extLst>
+          </p:cNvPr>
+          <p:cNvCxnSpPr>
+            <a:cxnSpLocks/>
+          </p:cNvCxnSpPr>
+          <p:nvPr/>
+        </p:nvCxnSpPr>
+        <p:spPr>
+          <a:xfrm>
+            <a:off x="6149790" y="4769222"/>
+            <a:ext cx="1084729" cy="0"/>
+          </a:xfrm>
+          <a:prstGeom prst="straightConnector1">
+            <a:avLst/>
+          </a:prstGeom>
+          <a:ln>
+            <a:tailEnd type="triangle"/>
+          </a:ln>
+        </p:spPr>
+        <p:style>
+          <a:lnRef idx="1">
+            <a:schemeClr val="accent1"/>
+          </a:lnRef>
+          <a:fillRef idx="0">
+            <a:schemeClr val="accent1"/>
+          </a:fillRef>
+          <a:effectRef idx="0">
+            <a:schemeClr val="accent1"/>
+          </a:effectRef>
+          <a:fontRef idx="minor">
+            <a:schemeClr val="tx1"/>
+          </a:fontRef>
+        </p:style>
+      </p:cxnSp>
+      <p:cxnSp>
+        <p:nvCxnSpPr>
+          <p:cNvPr id="31" name="Straight Connector 30">
+            <a:extLst>
+              <a:ext uri="{FF2B5EF4-FFF2-40B4-BE49-F238E27FC236}">
+                <a16:creationId xmlns:a16="http://schemas.microsoft.com/office/drawing/2014/main" id="{040F3802-7CA8-44D1-B856-C11C9F3E4899}"/>
+              </a:ext>
+            </a:extLst>
+          </p:cNvPr>
+          <p:cNvCxnSpPr>
+            <a:cxnSpLocks/>
+          </p:cNvCxnSpPr>
+          <p:nvPr/>
+        </p:nvCxnSpPr>
+        <p:spPr>
+          <a:xfrm>
+            <a:off x="6149790" y="2599767"/>
+            <a:ext cx="0" cy="2169455"/>
+          </a:xfrm>
+          <a:prstGeom prst="line">
+            <a:avLst/>
+          </a:prstGeom>
+        </p:spPr>
+        <p:style>
+          <a:lnRef idx="1">
+            <a:schemeClr val="accent1"/>
+          </a:lnRef>
+          <a:fillRef idx="0">
+            <a:schemeClr val="accent1"/>
+          </a:fillRef>
+          <a:effectRef idx="0">
+            <a:schemeClr val="accent1"/>
+          </a:effectRef>
+          <a:fontRef idx="minor">
+            <a:schemeClr val="tx1"/>
+          </a:fontRef>
+        </p:style>
+      </p:cxnSp>
+      <p:cxnSp>
+        <p:nvCxnSpPr>
+          <p:cNvPr id="35" name="Straight Arrow Connector 34">
+            <a:extLst>
+              <a:ext uri="{FF2B5EF4-FFF2-40B4-BE49-F238E27FC236}">
+                <a16:creationId xmlns:a16="http://schemas.microsoft.com/office/drawing/2014/main" id="{4EEB239A-4512-4194-A16E-878CC73C0007}"/>
+              </a:ext>
+            </a:extLst>
+          </p:cNvPr>
+          <p:cNvCxnSpPr/>
+          <p:nvPr/>
+        </p:nvCxnSpPr>
+        <p:spPr>
+          <a:xfrm>
+            <a:off x="5477436" y="2232214"/>
+            <a:ext cx="1757083" cy="0"/>
+          </a:xfrm>
+          <a:prstGeom prst="straightConnector1">
+            <a:avLst/>
+          </a:prstGeom>
+          <a:ln>
+            <a:tailEnd type="triangle"/>
+          </a:ln>
+        </p:spPr>
+        <p:style>
+          <a:lnRef idx="1">
+            <a:schemeClr val="accent1"/>
+          </a:lnRef>
+          <a:fillRef idx="0">
+            <a:schemeClr val="accent1"/>
+          </a:fillRef>
+          <a:effectRef idx="0">
+            <a:schemeClr val="accent1"/>
+          </a:effectRef>
+          <a:fontRef idx="minor">
+            <a:schemeClr val="tx1"/>
+          </a:fontRef>
+        </p:style>
+      </p:cxnSp>
+      <p:sp>
+        <p:nvSpPr>
+          <p:cNvPr id="38" name="TextBox 37">
+            <a:extLst>
+              <a:ext uri="{FF2B5EF4-FFF2-40B4-BE49-F238E27FC236}">
+                <a16:creationId xmlns:a16="http://schemas.microsoft.com/office/drawing/2014/main" id="{CF84DA7D-97EC-4A31-BC68-82AB18033A1C}"/>
+              </a:ext>
+            </a:extLst>
+          </p:cNvPr>
+          <p:cNvSpPr txBox="1"/>
+          <p:nvPr/>
+        </p:nvSpPr>
+        <p:spPr>
+          <a:xfrm>
+            <a:off x="1461248" y="667951"/>
+            <a:ext cx="8805487" cy="646331"/>
+          </a:xfrm>
+          <a:prstGeom prst="rect">
+            <a:avLst/>
+          </a:prstGeom>
+          <a:noFill/>
+        </p:spPr>
+        <p:txBody>
+          <a:bodyPr wrap="none" rtlCol="0">
+            <a:spAutoFit/>
+          </a:bodyPr>
+          <a:lstStyle/>
+          <a:p>
+            <a:r>
+              <a:rPr lang="en-AU" sz="3600" dirty="0">
+                <a:solidFill>
+                  <a:srgbClr val="4472C4"/>
+                </a:solidFill>
+              </a:rPr>
+              <a:t>ERD for Barcelona Road Traffic Accidents 2018</a:t>
+            </a:r>
+          </a:p>
+        </p:txBody>
+      </p:sp>
+    </p:spTree>
+    <p:extLst>
+      <p:ext uri="{BB962C8B-B14F-4D97-AF65-F5344CB8AC3E}">
+        <p14:creationId xmlns:p14="http://schemas.microsoft.com/office/powerpoint/2010/main" val="1083540183"/>
+      </p:ext>
+    </p:extLst>
+  </p:cSld>
+  <p:clrMapOvr>
+    <a:masterClrMapping/>
+  </p:clrMapOvr>
+</p:sld>
+</file>
+
+<file path=ppt/slides/slide2.xml><?xml version="1.0" encoding="utf-8"?>
+<p:sld xmlns:a="http://schemas.openxmlformats.org/drawingml/2006/main" xmlns:r="http://schemas.openxmlformats.org/officeDocument/2006/relationships" xmlns:p="http://schemas.openxmlformats.org/presentationml/2006/main">
+  <p:cSld>
+    <p:spTree>
+      <p:nvGrpSpPr>
+        <p:cNvPr id="1" name=""/>
+        <p:cNvGrpSpPr/>
+        <p:nvPr/>
+      </p:nvGrpSpPr>
+      <p:grpSpPr>
+        <a:xfrm>
+          <a:off x="0" y="0"/>
+          <a:ext cx="0" cy="0"/>
+          <a:chOff x="0" y="0"/>
+          <a:chExt cx="0" cy="0"/>
+        </a:xfrm>
+      </p:grpSpPr>
+      <p:graphicFrame>
+        <p:nvGraphicFramePr>
+          <p:cNvPr id="4" name="Table 4">
+            <a:extLst>
+              <a:ext uri="{FF2B5EF4-FFF2-40B4-BE49-F238E27FC236}">
+                <a16:creationId xmlns:a16="http://schemas.microsoft.com/office/drawing/2014/main" id="{BEC39CFE-C0B4-49CE-B7AC-CAC4DC62E161}"/>
+              </a:ext>
+            </a:extLst>
+          </p:cNvPr>
+          <p:cNvGraphicFramePr>
+            <a:graphicFrameLocks noGrp="1"/>
+          </p:cNvGraphicFramePr>
+          <p:nvPr>
+            <p:extLst>
+              <p:ext uri="{D42A27DB-BD31-4B8C-83A1-F6EECF244321}">
+                <p14:modId xmlns:p14="http://schemas.microsoft.com/office/powerpoint/2010/main" val="2460214512"/>
+              </p:ext>
+            </p:extLst>
+          </p:nvPr>
+        </p:nvGraphicFramePr>
+        <p:xfrm>
+          <a:off x="1362637" y="2402537"/>
           <a:ext cx="3104776" cy="1854200"/>
         </p:xfrm>
         <a:graphic>
@@ -3580,10 +4709,9 @@
                     <a:lstStyle/>
                     <a:p>
                       <a:r>
-                        <a:rPr lang="en-AU" dirty="0" err="1"/>
-                        <a:t>accident_vehicle</a:t>
-                      </a:r>
-                      <a:endParaRPr lang="en-AU" dirty="0"/>
+                        <a:rPr lang="en-AU" dirty="0"/>
+                        <a:t>street</a:t>
+                      </a:r>
                     </a:p>
                   </a:txBody>
                   <a:tcPr/>
@@ -3600,6 +4728,22 @@
                     <a:bodyPr/>
                     <a:lstStyle/>
                     <a:p>
+                      <a:r>
+                        <a:rPr lang="en-AU" b="1" dirty="0" err="1"/>
+                        <a:t>Street_ID</a:t>
+                      </a:r>
+                      <a:r>
+                        <a:rPr lang="en-AU" b="1" dirty="0"/>
+                        <a:t> (</a:t>
+                      </a:r>
+                      <a:r>
+                        <a:rPr lang="fr-FR" b="1" dirty="0" err="1"/>
+                        <a:t>Codi_carrer</a:t>
+                      </a:r>
+                      <a:r>
+                        <a:rPr lang="fr-FR" b="1" dirty="0"/>
+                        <a:t>)</a:t>
+                      </a:r>
                       <a:endParaRPr lang="en-AU" b="1" dirty="0"/>
                     </a:p>
                   </a:txBody>
@@ -3617,7 +4761,22 @@
                     <a:bodyPr/>
                     <a:lstStyle/>
                     <a:p>
-                      <a:endParaRPr lang="en-AU" dirty="0"/>
+                      <a:r>
+                        <a:rPr lang="en-AU" dirty="0" err="1"/>
+                        <a:t>street_name</a:t>
+                      </a:r>
+                      <a:r>
+                        <a:rPr lang="en-AU" dirty="0"/>
+                        <a:t> (</a:t>
+                      </a:r>
+                      <a:r>
+                        <a:rPr lang="en-AU" dirty="0" err="1"/>
+                        <a:t>Nom_carrer</a:t>
+                      </a:r>
+                      <a:r>
+                        <a:rPr lang="en-AU" dirty="0"/>
+                        <a:t>)</a:t>
+                      </a:r>
                     </a:p>
                   </a:txBody>
                   <a:tcPr/>
@@ -3634,7 +4793,22 @@
                     <a:bodyPr/>
                     <a:lstStyle/>
                     <a:p>
-                      <a:endParaRPr lang="en-AU" dirty="0"/>
+                      <a:r>
+                        <a:rPr lang="en-AU" dirty="0" err="1"/>
+                        <a:t>suburb_name</a:t>
+                      </a:r>
+                      <a:r>
+                        <a:rPr lang="en-AU" dirty="0"/>
+                        <a:t> (</a:t>
+                      </a:r>
+                      <a:r>
+                        <a:rPr lang="en-AU" dirty="0" err="1"/>
+                        <a:t>Nom_barri</a:t>
+                      </a:r>
+                      <a:r>
+                        <a:rPr lang="en-AU" dirty="0"/>
+                        <a:t>)</a:t>
+                      </a:r>
                     </a:p>
                   </a:txBody>
                   <a:tcPr/>
@@ -3651,7 +4825,22 @@
                     <a:bodyPr/>
                     <a:lstStyle/>
                     <a:p>
-                      <a:endParaRPr lang="en-AU" dirty="0"/>
+                      <a:r>
+                        <a:rPr lang="en-AU" dirty="0" err="1"/>
+                        <a:t>district_name</a:t>
+                      </a:r>
+                      <a:r>
+                        <a:rPr lang="en-AU" dirty="0"/>
+                        <a:t> (</a:t>
+                      </a:r>
+                      <a:r>
+                        <a:rPr lang="en-AU" dirty="0" err="1"/>
+                        <a:t>Nom_districte</a:t>
+                      </a:r>
+                      <a:r>
+                        <a:rPr lang="en-AU" dirty="0"/>
+                        <a:t>)</a:t>
+                      </a:r>
                     </a:p>
                   </a:txBody>
                   <a:tcPr/>
@@ -3668,10 +4857,10 @@
       </p:graphicFrame>
       <p:graphicFrame>
         <p:nvGraphicFramePr>
-          <p:cNvPr id="8" name="Table 4">
-            <a:extLst>
-              <a:ext uri="{FF2B5EF4-FFF2-40B4-BE49-F238E27FC236}">
-                <a16:creationId xmlns:a16="http://schemas.microsoft.com/office/drawing/2014/main" id="{307D97ED-324F-4C91-B8AC-61E644473072}"/>
+          <p:cNvPr id="9" name="Table 4">
+            <a:extLst>
+              <a:ext uri="{FF2B5EF4-FFF2-40B4-BE49-F238E27FC236}">
+                <a16:creationId xmlns:a16="http://schemas.microsoft.com/office/drawing/2014/main" id="{6E736901-8F3A-4316-81B8-5840FE240004}"/>
               </a:ext>
             </a:extLst>
           </p:cNvPr>
@@ -3681,14 +4870,14 @@
           <p:nvPr>
             <p:extLst>
               <p:ext uri="{D42A27DB-BD31-4B8C-83A1-F6EECF244321}">
-                <p14:modId xmlns:p14="http://schemas.microsoft.com/office/powerpoint/2010/main" val="2701772095"/>
+                <p14:modId xmlns:p14="http://schemas.microsoft.com/office/powerpoint/2010/main" val="3344352455"/>
               </p:ext>
             </p:extLst>
           </p:nvPr>
         </p:nvGraphicFramePr>
         <p:xfrm>
-          <a:off x="1361142" y="4036607"/>
-          <a:ext cx="3104776" cy="1854200"/>
+          <a:off x="1343215" y="4335323"/>
+          <a:ext cx="3104776" cy="2214880"/>
         </p:xfrm>
         <a:graphic>
           <a:graphicData uri="http://schemas.openxmlformats.org/drawingml/2006/table">
@@ -3712,9 +4901,10 @@
                     <a:lstStyle/>
                     <a:p>
                       <a:r>
-                        <a:rPr lang="en-AU" dirty="0"/>
-                        <a:t>accident</a:t>
-                      </a:r>
+                        <a:rPr lang="en-AU" dirty="0" err="1"/>
+                        <a:t>accident_datetime</a:t>
+                      </a:r>
+                      <a:endParaRPr lang="en-AU" dirty="0"/>
                     </a:p>
                   </a:txBody>
                   <a:tcPr/>
@@ -3731,7 +4921,39 @@
                     <a:bodyPr/>
                     <a:lstStyle/>
                     <a:p>
-                      <a:endParaRPr lang="en-AU" b="1" dirty="0"/>
+                      <a:pPr marL="0" marR="0" lvl="0" indent="0" algn="l" defTabSz="914400" rtl="0" eaLnBrk="1" fontAlgn="auto" latinLnBrk="0" hangingPunct="1">
+                        <a:lnSpc>
+                          <a:spcPct val="100000"/>
+                        </a:lnSpc>
+                        <a:spcBef>
+                          <a:spcPts val="0"/>
+                        </a:spcBef>
+                        <a:spcAft>
+                          <a:spcPts val="0"/>
+                        </a:spcAft>
+                        <a:buClrTx/>
+                        <a:buSzTx/>
+                        <a:buFontTx/>
+                        <a:buNone/>
+                        <a:tabLst/>
+                        <a:defRPr/>
+                      </a:pPr>
+                      <a:r>
+                        <a:rPr lang="en-AU" b="1" dirty="0" err="1"/>
+                        <a:t>accident_id</a:t>
+                      </a:r>
+                      <a:r>
+                        <a:rPr lang="en-AU" b="1" dirty="0"/>
+                        <a:t> (</a:t>
+                      </a:r>
+                      <a:r>
+                        <a:rPr lang="en-AU" b="1" dirty="0" err="1"/>
+                        <a:t>Codi_expedient</a:t>
+                      </a:r>
+                      <a:r>
+                        <a:rPr lang="en-AU" b="1" dirty="0"/>
+                        <a:t>)</a:t>
+                      </a:r>
                     </a:p>
                   </a:txBody>
                   <a:tcPr/>
@@ -3742,13 +4964,45 @@
                   </a:ext>
                 </a:extLst>
               </a:tr>
-              <a:tr h="370840">
+              <a:tr h="320040">
                 <a:tc>
                   <a:txBody>
                     <a:bodyPr/>
                     <a:lstStyle/>
                     <a:p>
-                      <a:endParaRPr lang="en-AU" dirty="0"/>
+                      <a:pPr marL="0" marR="0" lvl="0" indent="0" algn="l" defTabSz="914400" rtl="0" eaLnBrk="1" fontAlgn="auto" latinLnBrk="0" hangingPunct="1">
+                        <a:lnSpc>
+                          <a:spcPct val="100000"/>
+                        </a:lnSpc>
+                        <a:spcBef>
+                          <a:spcPts val="0"/>
+                        </a:spcBef>
+                        <a:spcAft>
+                          <a:spcPts val="0"/>
+                        </a:spcAft>
+                        <a:buClrTx/>
+                        <a:buSzTx/>
+                        <a:buFontTx/>
+                        <a:buNone/>
+                        <a:tabLst/>
+                        <a:defRPr/>
+                      </a:pPr>
+                      <a:r>
+                        <a:rPr lang="es-ES" dirty="0" err="1"/>
+                        <a:t>hour</a:t>
+                      </a:r>
+                      <a:r>
+                        <a:rPr lang="es-ES" dirty="0"/>
+                        <a:t> (</a:t>
+                      </a:r>
+                      <a:r>
+                        <a:rPr lang="es-ES" dirty="0" err="1"/>
+                        <a:t>Hoa_dia</a:t>
+                      </a:r>
+                      <a:r>
+                        <a:rPr lang="es-ES" dirty="0"/>
+                        <a:t>)</a:t>
+                      </a:r>
                     </a:p>
                   </a:txBody>
                   <a:tcPr/>
@@ -3759,13 +5013,94 @@
                   </a:ext>
                 </a:extLst>
               </a:tr>
+              <a:tr h="320040">
+                <a:tc>
+                  <a:txBody>
+                    <a:bodyPr/>
+                    <a:lstStyle/>
+                    <a:p>
+                      <a:pPr marL="0" marR="0" lvl="0" indent="0" algn="l" defTabSz="914400" rtl="0" eaLnBrk="1" fontAlgn="auto" latinLnBrk="0" hangingPunct="1">
+                        <a:lnSpc>
+                          <a:spcPct val="100000"/>
+                        </a:lnSpc>
+                        <a:spcBef>
+                          <a:spcPts val="0"/>
+                        </a:spcBef>
+                        <a:spcAft>
+                          <a:spcPts val="0"/>
+                        </a:spcAft>
+                        <a:buClrTx/>
+                        <a:buSzTx/>
+                        <a:buFontTx/>
+                        <a:buNone/>
+                        <a:tabLst/>
+                        <a:defRPr/>
+                      </a:pPr>
+                      <a:r>
+                        <a:rPr lang="es-ES" dirty="0" err="1"/>
+                        <a:t>day</a:t>
+                      </a:r>
+                      <a:r>
+                        <a:rPr lang="es-ES" dirty="0"/>
+                        <a:t> (</a:t>
+                      </a:r>
+                      <a:r>
+                        <a:rPr lang="es-ES" dirty="0" err="1"/>
+                        <a:t>Dia_mes</a:t>
+                      </a:r>
+                      <a:r>
+                        <a:rPr lang="es-ES" dirty="0"/>
+                        <a:t>)</a:t>
+                      </a:r>
+                    </a:p>
+                  </a:txBody>
+                  <a:tcPr/>
+                </a:tc>
+                <a:extLst>
+                  <a:ext uri="{0D108BD9-81ED-4DB2-BD59-A6C34878D82A}">
+                    <a16:rowId xmlns:a16="http://schemas.microsoft.com/office/drawing/2014/main" val="2101100313"/>
+                  </a:ext>
+                </a:extLst>
+              </a:tr>
               <a:tr h="370840">
                 <a:tc>
                   <a:txBody>
                     <a:bodyPr/>
                     <a:lstStyle/>
                     <a:p>
-                      <a:endParaRPr lang="en-AU" dirty="0"/>
+                      <a:pPr marL="0" marR="0" lvl="0" indent="0" algn="l" defTabSz="914400" rtl="0" eaLnBrk="1" fontAlgn="auto" latinLnBrk="0" hangingPunct="1">
+                        <a:lnSpc>
+                          <a:spcPct val="100000"/>
+                        </a:lnSpc>
+                        <a:spcBef>
+                          <a:spcPts val="0"/>
+                        </a:spcBef>
+                        <a:spcAft>
+                          <a:spcPts val="0"/>
+                        </a:spcAft>
+                        <a:buClrTx/>
+                        <a:buSzTx/>
+                        <a:buFontTx/>
+                        <a:buNone/>
+                        <a:tabLst/>
+                        <a:defRPr/>
+                      </a:pPr>
+                      <a:r>
+                        <a:rPr lang="es-ES" dirty="0" err="1"/>
+                        <a:t>month</a:t>
+                      </a:r>
+                      <a:r>
+                        <a:rPr lang="es-ES" dirty="0"/>
+                        <a:t> (</a:t>
+                      </a:r>
+                      <a:r>
+                        <a:rPr lang="es-ES" dirty="0" err="1"/>
+                        <a:t>Mes_any</a:t>
+                      </a:r>
+                      <a:r>
+                        <a:rPr lang="es-ES" dirty="0"/>
+                        <a:t>)</a:t>
+                      </a:r>
                     </a:p>
                   </a:txBody>
                   <a:tcPr/>
@@ -3782,6 +5117,22 @@
                     <a:bodyPr/>
                     <a:lstStyle/>
                     <a:p>
+                      <a:r>
+                        <a:rPr lang="es-ES" dirty="0" err="1"/>
+                        <a:t>year</a:t>
+                      </a:r>
+                      <a:r>
+                        <a:rPr lang="es-ES" dirty="0"/>
+                        <a:t> (</a:t>
+                      </a:r>
+                      <a:r>
+                        <a:rPr lang="es-ES" dirty="0" err="1"/>
+                        <a:t>Any</a:t>
+                      </a:r>
+                      <a:r>
+                        <a:rPr lang="es-ES" dirty="0"/>
+                        <a:t>)</a:t>
+                      </a:r>
                       <a:endParaRPr lang="en-AU" dirty="0"/>
                     </a:p>
                   </a:txBody>
@@ -3799,10 +5150,10 @@
       </p:graphicFrame>
       <p:graphicFrame>
         <p:nvGraphicFramePr>
-          <p:cNvPr id="9" name="Table 4">
-            <a:extLst>
-              <a:ext uri="{FF2B5EF4-FFF2-40B4-BE49-F238E27FC236}">
-                <a16:creationId xmlns:a16="http://schemas.microsoft.com/office/drawing/2014/main" id="{6E736901-8F3A-4316-81B8-5840FE240004}"/>
+          <p:cNvPr id="6" name="Table 4">
+            <a:extLst>
+              <a:ext uri="{FF2B5EF4-FFF2-40B4-BE49-F238E27FC236}">
+                <a16:creationId xmlns:a16="http://schemas.microsoft.com/office/drawing/2014/main" id="{C576A95B-C689-497E-AA0E-F1D4C406402C}"/>
               </a:ext>
             </a:extLst>
           </p:cNvPr>
@@ -3812,14 +5163,14 @@
           <p:nvPr>
             <p:extLst>
               <p:ext uri="{D42A27DB-BD31-4B8C-83A1-F6EECF244321}">
-                <p14:modId xmlns:p14="http://schemas.microsoft.com/office/powerpoint/2010/main" val="923527666"/>
+                <p14:modId xmlns:p14="http://schemas.microsoft.com/office/powerpoint/2010/main" val="308256750"/>
               </p:ext>
             </p:extLst>
           </p:nvPr>
         </p:nvGraphicFramePr>
         <p:xfrm>
-          <a:off x="6096000" y="4036607"/>
-          <a:ext cx="3104776" cy="1854200"/>
+          <a:off x="7636435" y="840591"/>
+          <a:ext cx="3104776" cy="2214880"/>
         </p:xfrm>
         <a:graphic>
           <a:graphicData uri="http://schemas.openxmlformats.org/drawingml/2006/table">
@@ -3844,7 +5195,7 @@
                     <a:p>
                       <a:r>
                         <a:rPr lang="en-AU" dirty="0" err="1"/>
-                        <a:t>accident_time</a:t>
+                        <a:t>accident_location</a:t>
                       </a:r>
                       <a:endParaRPr lang="en-AU" dirty="0"/>
                     </a:p>
@@ -3863,7 +5214,39 @@
                     <a:bodyPr/>
                     <a:lstStyle/>
                     <a:p>
-                      <a:endParaRPr lang="en-AU" b="1" dirty="0"/>
+                      <a:pPr marL="0" marR="0" lvl="0" indent="0" algn="l" defTabSz="914400" rtl="0" eaLnBrk="1" fontAlgn="auto" latinLnBrk="0" hangingPunct="1">
+                        <a:lnSpc>
+                          <a:spcPct val="100000"/>
+                        </a:lnSpc>
+                        <a:spcBef>
+                          <a:spcPts val="0"/>
+                        </a:spcBef>
+                        <a:spcAft>
+                          <a:spcPts val="0"/>
+                        </a:spcAft>
+                        <a:buClrTx/>
+                        <a:buSzTx/>
+                        <a:buFontTx/>
+                        <a:buNone/>
+                        <a:tabLst/>
+                        <a:defRPr/>
+                      </a:pPr>
+                      <a:r>
+                        <a:rPr lang="en-AU" b="1" dirty="0" err="1"/>
+                        <a:t>accident_id</a:t>
+                      </a:r>
+                      <a:r>
+                        <a:rPr lang="en-AU" b="1" dirty="0"/>
+                        <a:t> (</a:t>
+                      </a:r>
+                      <a:r>
+                        <a:rPr lang="en-AU" b="1" dirty="0" err="1"/>
+                        <a:t>Codi_expedient</a:t>
+                      </a:r>
+                      <a:r>
+                        <a:rPr lang="en-AU" b="1" dirty="0"/>
+                        <a:t>)</a:t>
+                      </a:r>
                     </a:p>
                   </a:txBody>
                   <a:tcPr/>
@@ -3880,7 +5263,22 @@
                     <a:bodyPr/>
                     <a:lstStyle/>
                     <a:p>
-                      <a:endParaRPr lang="en-AU" dirty="0"/>
+                      <a:r>
+                        <a:rPr lang="es-ES" b="0" dirty="0" err="1"/>
+                        <a:t>X_coord</a:t>
+                      </a:r>
+                      <a:r>
+                        <a:rPr lang="es-ES" b="0" dirty="0"/>
+                        <a:t> (</a:t>
+                      </a:r>
+                      <a:r>
+                        <a:rPr lang="es-ES" b="0" dirty="0" err="1"/>
+                        <a:t>Coordenada_UTM_X</a:t>
+                      </a:r>
+                      <a:r>
+                        <a:rPr lang="es-ES" b="0" dirty="0"/>
+                        <a:t>)</a:t>
+                      </a:r>
                     </a:p>
                   </a:txBody>
                   <a:tcPr/>
@@ -3897,7 +5295,983 @@
                     <a:bodyPr/>
                     <a:lstStyle/>
                     <a:p>
+                      <a:pPr marL="0" marR="0" lvl="0" indent="0" algn="l" defTabSz="914400" rtl="0" eaLnBrk="1" fontAlgn="auto" latinLnBrk="0" hangingPunct="1">
+                        <a:lnSpc>
+                          <a:spcPct val="100000"/>
+                        </a:lnSpc>
+                        <a:spcBef>
+                          <a:spcPts val="0"/>
+                        </a:spcBef>
+                        <a:spcAft>
+                          <a:spcPts val="0"/>
+                        </a:spcAft>
+                        <a:buClrTx/>
+                        <a:buSzTx/>
+                        <a:buFontTx/>
+                        <a:buNone/>
+                        <a:tabLst/>
+                        <a:defRPr/>
+                      </a:pPr>
+                      <a:r>
+                        <a:rPr lang="es-ES" b="0" dirty="0" err="1"/>
+                        <a:t>Y_coord</a:t>
+                      </a:r>
+                      <a:r>
+                        <a:rPr lang="es-ES" b="0" dirty="0"/>
+                        <a:t> (</a:t>
+                      </a:r>
+                      <a:r>
+                        <a:rPr lang="es-ES" b="0" dirty="0" err="1"/>
+                        <a:t>Coordenada_UTM_Y</a:t>
+                      </a:r>
+                      <a:r>
+                        <a:rPr lang="es-ES" b="0" dirty="0"/>
+                        <a:t>)</a:t>
+                      </a:r>
                       <a:endParaRPr lang="en-AU" dirty="0"/>
+                    </a:p>
+                  </a:txBody>
+                  <a:tcPr/>
+                </a:tc>
+                <a:extLst>
+                  <a:ext uri="{0D108BD9-81ED-4DB2-BD59-A6C34878D82A}">
+                    <a16:rowId xmlns:a16="http://schemas.microsoft.com/office/drawing/2014/main" val="2446308387"/>
+                  </a:ext>
+                </a:extLst>
+              </a:tr>
+              <a:tr h="185420">
+                <a:tc>
+                  <a:txBody>
+                    <a:bodyPr/>
+                    <a:lstStyle/>
+                    <a:p>
+                      <a:pPr marL="0" marR="0" lvl="0" indent="0" algn="l" defTabSz="914400" rtl="0" eaLnBrk="1" fontAlgn="auto" latinLnBrk="0" hangingPunct="1">
+                        <a:lnSpc>
+                          <a:spcPct val="100000"/>
+                        </a:lnSpc>
+                        <a:spcBef>
+                          <a:spcPts val="0"/>
+                        </a:spcBef>
+                        <a:spcAft>
+                          <a:spcPts val="0"/>
+                        </a:spcAft>
+                        <a:buClrTx/>
+                        <a:buSzTx/>
+                        <a:buFontTx/>
+                        <a:buNone/>
+                        <a:tabLst/>
+                        <a:defRPr/>
+                      </a:pPr>
+                      <a:r>
+                        <a:rPr lang="es-ES" b="0" dirty="0" err="1"/>
+                        <a:t>longitude</a:t>
+                      </a:r>
+                      <a:r>
+                        <a:rPr lang="es-ES" b="0" dirty="0"/>
+                        <a:t> (Longitud)</a:t>
+                      </a:r>
+                      <a:endParaRPr lang="en-AU" dirty="0"/>
+                    </a:p>
+                  </a:txBody>
+                  <a:tcPr/>
+                </a:tc>
+                <a:extLst>
+                  <a:ext uri="{0D108BD9-81ED-4DB2-BD59-A6C34878D82A}">
+                    <a16:rowId xmlns:a16="http://schemas.microsoft.com/office/drawing/2014/main" val="3257835866"/>
+                  </a:ext>
+                </a:extLst>
+              </a:tr>
+              <a:tr h="185420">
+                <a:tc>
+                  <a:txBody>
+                    <a:bodyPr/>
+                    <a:lstStyle/>
+                    <a:p>
+                      <a:pPr marL="0" marR="0" lvl="0" indent="0" algn="l" defTabSz="914400" rtl="0" eaLnBrk="1" fontAlgn="auto" latinLnBrk="0" hangingPunct="1">
+                        <a:lnSpc>
+                          <a:spcPct val="100000"/>
+                        </a:lnSpc>
+                        <a:spcBef>
+                          <a:spcPts val="0"/>
+                        </a:spcBef>
+                        <a:spcAft>
+                          <a:spcPts val="0"/>
+                        </a:spcAft>
+                        <a:buClrTx/>
+                        <a:buSzTx/>
+                        <a:buFontTx/>
+                        <a:buNone/>
+                        <a:tabLst/>
+                        <a:defRPr/>
+                      </a:pPr>
+                      <a:r>
+                        <a:rPr lang="es-ES" b="0" dirty="0" err="1"/>
+                        <a:t>latitude</a:t>
+                      </a:r>
+                      <a:r>
+                        <a:rPr lang="es-ES" b="0" dirty="0"/>
+                        <a:t> (Latitud</a:t>
+                      </a:r>
+                      <a:r>
+                        <a:rPr lang="en-AU" b="0" dirty="0"/>
+                        <a:t>)</a:t>
+                      </a:r>
+                      <a:endParaRPr lang="en-AU" dirty="0"/>
+                    </a:p>
+                  </a:txBody>
+                  <a:tcPr/>
+                </a:tc>
+                <a:extLst>
+                  <a:ext uri="{0D108BD9-81ED-4DB2-BD59-A6C34878D82A}">
+                    <a16:rowId xmlns:a16="http://schemas.microsoft.com/office/drawing/2014/main" val="3696940409"/>
+                  </a:ext>
+                </a:extLst>
+              </a:tr>
+            </a:tbl>
+          </a:graphicData>
+        </a:graphic>
+      </p:graphicFrame>
+      <p:graphicFrame>
+        <p:nvGraphicFramePr>
+          <p:cNvPr id="2" name="Table 2">
+            <a:extLst>
+              <a:ext uri="{FF2B5EF4-FFF2-40B4-BE49-F238E27FC236}">
+                <a16:creationId xmlns:a16="http://schemas.microsoft.com/office/drawing/2014/main" id="{C4524260-2538-4CAD-819D-644BAB9A9BA4}"/>
+              </a:ext>
+            </a:extLst>
+          </p:cNvPr>
+          <p:cNvGraphicFramePr>
+            <a:graphicFrameLocks noGrp="1"/>
+          </p:cNvGraphicFramePr>
+          <p:nvPr>
+            <p:extLst>
+              <p:ext uri="{D42A27DB-BD31-4B8C-83A1-F6EECF244321}">
+                <p14:modId xmlns:p14="http://schemas.microsoft.com/office/powerpoint/2010/main" val="1158337581"/>
+              </p:ext>
+            </p:extLst>
+          </p:nvPr>
+        </p:nvGraphicFramePr>
+        <p:xfrm>
+          <a:off x="1362637" y="840591"/>
+          <a:ext cx="3693459" cy="1483360"/>
+        </p:xfrm>
+        <a:graphic>
+          <a:graphicData uri="http://schemas.openxmlformats.org/drawingml/2006/table">
+            <a:tbl>
+              <a:tblPr firstRow="1" bandRow="1">
+                <a:tableStyleId>{5C22544A-7EE6-4342-B048-85BDC9FD1C3A}</a:tableStyleId>
+              </a:tblPr>
+              <a:tblGrid>
+                <a:gridCol w="3693459">
+                  <a:extLst>
+                    <a:ext uri="{9D8B030D-6E8A-4147-A177-3AD203B41FA5}">
+                      <a16:colId xmlns:a16="http://schemas.microsoft.com/office/drawing/2014/main" val="179097989"/>
+                    </a:ext>
+                  </a:extLst>
+                </a:gridCol>
+              </a:tblGrid>
+              <a:tr h="370840">
+                <a:tc>
+                  <a:txBody>
+                    <a:bodyPr/>
+                    <a:lstStyle/>
+                    <a:p>
+                      <a:r>
+                        <a:rPr lang="en-AU" dirty="0"/>
+                        <a:t>accident</a:t>
+                      </a:r>
+                    </a:p>
+                  </a:txBody>
+                  <a:tcPr/>
+                </a:tc>
+                <a:extLst>
+                  <a:ext uri="{0D108BD9-81ED-4DB2-BD59-A6C34878D82A}">
+                    <a16:rowId xmlns:a16="http://schemas.microsoft.com/office/drawing/2014/main" val="3934754049"/>
+                  </a:ext>
+                </a:extLst>
+              </a:tr>
+              <a:tr h="370840">
+                <a:tc>
+                  <a:txBody>
+                    <a:bodyPr/>
+                    <a:lstStyle/>
+                    <a:p>
+                      <a:pPr marL="0" marR="0" lvl="0" indent="0" algn="l" defTabSz="914400" rtl="0" eaLnBrk="1" fontAlgn="auto" latinLnBrk="0" hangingPunct="1">
+                        <a:lnSpc>
+                          <a:spcPct val="100000"/>
+                        </a:lnSpc>
+                        <a:spcBef>
+                          <a:spcPts val="0"/>
+                        </a:spcBef>
+                        <a:spcAft>
+                          <a:spcPts val="0"/>
+                        </a:spcAft>
+                        <a:buClrTx/>
+                        <a:buSzTx/>
+                        <a:buFontTx/>
+                        <a:buNone/>
+                        <a:tabLst/>
+                        <a:defRPr/>
+                      </a:pPr>
+                      <a:r>
+                        <a:rPr lang="en-AU" b="1" dirty="0" err="1"/>
+                        <a:t>accident_id</a:t>
+                      </a:r>
+                      <a:r>
+                        <a:rPr lang="en-AU" b="1" dirty="0"/>
+                        <a:t> (</a:t>
+                      </a:r>
+                      <a:r>
+                        <a:rPr lang="en-AU" b="1" dirty="0" err="1"/>
+                        <a:t>Codi_expedient</a:t>
+                      </a:r>
+                      <a:r>
+                        <a:rPr lang="en-AU" b="1" dirty="0"/>
+                        <a:t>)</a:t>
+                      </a:r>
+                    </a:p>
+                  </a:txBody>
+                  <a:tcPr/>
+                </a:tc>
+                <a:extLst>
+                  <a:ext uri="{0D108BD9-81ED-4DB2-BD59-A6C34878D82A}">
+                    <a16:rowId xmlns:a16="http://schemas.microsoft.com/office/drawing/2014/main" val="379520170"/>
+                  </a:ext>
+                </a:extLst>
+              </a:tr>
+              <a:tr h="370840">
+                <a:tc>
+                  <a:txBody>
+                    <a:bodyPr/>
+                    <a:lstStyle/>
+                    <a:p>
+                      <a:pPr marL="0" marR="0" lvl="0" indent="0" algn="l" defTabSz="914400" rtl="0" eaLnBrk="1" fontAlgn="auto" latinLnBrk="0" hangingPunct="1">
+                        <a:lnSpc>
+                          <a:spcPct val="100000"/>
+                        </a:lnSpc>
+                        <a:spcBef>
+                          <a:spcPts val="0"/>
+                        </a:spcBef>
+                        <a:spcAft>
+                          <a:spcPts val="0"/>
+                        </a:spcAft>
+                        <a:buClrTx/>
+                        <a:buSzTx/>
+                        <a:buFontTx/>
+                        <a:buNone/>
+                        <a:tabLst/>
+                        <a:defRPr/>
+                      </a:pPr>
+                      <a:r>
+                        <a:rPr lang="en-AU" b="0" dirty="0" err="1"/>
+                        <a:t>street_ID</a:t>
+                      </a:r>
+                      <a:r>
+                        <a:rPr lang="en-AU" b="0" dirty="0"/>
+                        <a:t> (</a:t>
+                      </a:r>
+                      <a:r>
+                        <a:rPr lang="fr-FR" b="0" dirty="0" err="1"/>
+                        <a:t>Codi_carrer</a:t>
+                      </a:r>
+                      <a:r>
+                        <a:rPr lang="fr-FR" b="0" dirty="0"/>
+                        <a:t>)</a:t>
+                      </a:r>
+                      <a:endParaRPr lang="en-AU" b="0" dirty="0"/>
+                    </a:p>
+                  </a:txBody>
+                  <a:tcPr/>
+                </a:tc>
+                <a:extLst>
+                  <a:ext uri="{0D108BD9-81ED-4DB2-BD59-A6C34878D82A}">
+                    <a16:rowId xmlns:a16="http://schemas.microsoft.com/office/drawing/2014/main" val="3515270600"/>
+                  </a:ext>
+                </a:extLst>
+              </a:tr>
+              <a:tr h="370840">
+                <a:tc>
+                  <a:txBody>
+                    <a:bodyPr/>
+                    <a:lstStyle/>
+                    <a:p>
+                      <a:pPr marL="0" marR="0" lvl="0" indent="0" algn="l" defTabSz="914400" rtl="0" eaLnBrk="1" fontAlgn="auto" latinLnBrk="0" hangingPunct="1">
+                        <a:lnSpc>
+                          <a:spcPct val="100000"/>
+                        </a:lnSpc>
+                        <a:spcBef>
+                          <a:spcPts val="0"/>
+                        </a:spcBef>
+                        <a:spcAft>
+                          <a:spcPts val="0"/>
+                        </a:spcAft>
+                        <a:buClrTx/>
+                        <a:buSzTx/>
+                        <a:buFontTx/>
+                        <a:buNone/>
+                        <a:tabLst/>
+                        <a:defRPr/>
+                      </a:pPr>
+                      <a:r>
+                        <a:rPr lang="en-AU" dirty="0" err="1"/>
+                        <a:t>acc_desc</a:t>
+                      </a:r>
+                      <a:r>
+                        <a:rPr lang="en-AU" dirty="0"/>
+                        <a:t> (</a:t>
+                      </a:r>
+                      <a:r>
+                        <a:rPr lang="en-AU" dirty="0" err="1"/>
+                        <a:t>Descripcio_causa_vianant</a:t>
+                      </a:r>
+                      <a:r>
+                        <a:rPr lang="en-AU" dirty="0"/>
+                        <a:t>)</a:t>
+                      </a:r>
+                    </a:p>
+                  </a:txBody>
+                  <a:tcPr/>
+                </a:tc>
+                <a:extLst>
+                  <a:ext uri="{0D108BD9-81ED-4DB2-BD59-A6C34878D82A}">
+                    <a16:rowId xmlns:a16="http://schemas.microsoft.com/office/drawing/2014/main" val="849158257"/>
+                  </a:ext>
+                </a:extLst>
+              </a:tr>
+            </a:tbl>
+          </a:graphicData>
+        </a:graphic>
+      </p:graphicFrame>
+      <p:cxnSp>
+        <p:nvCxnSpPr>
+          <p:cNvPr id="13" name="Straight Connector 12">
+            <a:extLst>
+              <a:ext uri="{FF2B5EF4-FFF2-40B4-BE49-F238E27FC236}">
+                <a16:creationId xmlns:a16="http://schemas.microsoft.com/office/drawing/2014/main" id="{E66D8512-B802-4D57-8436-479B7110D33B}"/>
+              </a:ext>
+            </a:extLst>
+          </p:cNvPr>
+          <p:cNvCxnSpPr>
+            <a:cxnSpLocks/>
+          </p:cNvCxnSpPr>
+          <p:nvPr/>
+        </p:nvCxnSpPr>
+        <p:spPr>
+          <a:xfrm flipH="1">
+            <a:off x="1210239" y="1389530"/>
+            <a:ext cx="152399" cy="0"/>
+          </a:xfrm>
+          <a:prstGeom prst="line">
+            <a:avLst/>
+          </a:prstGeom>
+        </p:spPr>
+        <p:style>
+          <a:lnRef idx="1">
+            <a:schemeClr val="accent1"/>
+          </a:lnRef>
+          <a:fillRef idx="0">
+            <a:schemeClr val="accent1"/>
+          </a:fillRef>
+          <a:effectRef idx="0">
+            <a:schemeClr val="accent1"/>
+          </a:effectRef>
+          <a:fontRef idx="minor">
+            <a:schemeClr val="tx1"/>
+          </a:fontRef>
+        </p:style>
+      </p:cxnSp>
+      <p:cxnSp>
+        <p:nvCxnSpPr>
+          <p:cNvPr id="15" name="Straight Connector 14">
+            <a:extLst>
+              <a:ext uri="{FF2B5EF4-FFF2-40B4-BE49-F238E27FC236}">
+                <a16:creationId xmlns:a16="http://schemas.microsoft.com/office/drawing/2014/main" id="{CD0762AE-999F-43A2-B2AE-227E15FA7C6F}"/>
+              </a:ext>
+            </a:extLst>
+          </p:cNvPr>
+          <p:cNvCxnSpPr>
+            <a:cxnSpLocks/>
+          </p:cNvCxnSpPr>
+          <p:nvPr/>
+        </p:nvCxnSpPr>
+        <p:spPr>
+          <a:xfrm flipV="1">
+            <a:off x="1210239" y="1389530"/>
+            <a:ext cx="0" cy="3209369"/>
+          </a:xfrm>
+          <a:prstGeom prst="line">
+            <a:avLst/>
+          </a:prstGeom>
+        </p:spPr>
+        <p:style>
+          <a:lnRef idx="1">
+            <a:schemeClr val="accent1"/>
+          </a:lnRef>
+          <a:fillRef idx="0">
+            <a:schemeClr val="accent1"/>
+          </a:fillRef>
+          <a:effectRef idx="0">
+            <a:schemeClr val="accent1"/>
+          </a:effectRef>
+          <a:fontRef idx="minor">
+            <a:schemeClr val="tx1"/>
+          </a:fontRef>
+        </p:style>
+      </p:cxnSp>
+      <p:cxnSp>
+        <p:nvCxnSpPr>
+          <p:cNvPr id="24" name="Straight Arrow Connector 23">
+            <a:extLst>
+              <a:ext uri="{FF2B5EF4-FFF2-40B4-BE49-F238E27FC236}">
+                <a16:creationId xmlns:a16="http://schemas.microsoft.com/office/drawing/2014/main" id="{C074F5FB-741F-4B23-807F-0C5267CAD238}"/>
+              </a:ext>
+            </a:extLst>
+          </p:cNvPr>
+          <p:cNvCxnSpPr>
+            <a:cxnSpLocks/>
+          </p:cNvCxnSpPr>
+          <p:nvPr/>
+        </p:nvCxnSpPr>
+        <p:spPr>
+          <a:xfrm>
+            <a:off x="1210239" y="4598899"/>
+            <a:ext cx="152398" cy="0"/>
+          </a:xfrm>
+          <a:prstGeom prst="straightConnector1">
+            <a:avLst/>
+          </a:prstGeom>
+          <a:ln>
+            <a:tailEnd type="triangle"/>
+          </a:ln>
+        </p:spPr>
+        <p:style>
+          <a:lnRef idx="1">
+            <a:schemeClr val="accent1"/>
+          </a:lnRef>
+          <a:fillRef idx="0">
+            <a:schemeClr val="accent1"/>
+          </a:fillRef>
+          <a:effectRef idx="0">
+            <a:schemeClr val="accent1"/>
+          </a:effectRef>
+          <a:fontRef idx="minor">
+            <a:schemeClr val="tx1"/>
+          </a:fontRef>
+        </p:style>
+      </p:cxnSp>
+      <p:cxnSp>
+        <p:nvCxnSpPr>
+          <p:cNvPr id="29" name="Straight Arrow Connector 28">
+            <a:extLst>
+              <a:ext uri="{FF2B5EF4-FFF2-40B4-BE49-F238E27FC236}">
+                <a16:creationId xmlns:a16="http://schemas.microsoft.com/office/drawing/2014/main" id="{B1F27FEF-40F5-4807-9C54-F3228D5BCF5A}"/>
+              </a:ext>
+            </a:extLst>
+          </p:cNvPr>
+          <p:cNvCxnSpPr>
+            <a:cxnSpLocks/>
+          </p:cNvCxnSpPr>
+          <p:nvPr/>
+        </p:nvCxnSpPr>
+        <p:spPr>
+          <a:xfrm>
+            <a:off x="5477439" y="3792070"/>
+            <a:ext cx="251011" cy="0"/>
+          </a:xfrm>
+          <a:prstGeom prst="straightConnector1">
+            <a:avLst/>
+          </a:prstGeom>
+          <a:ln>
+            <a:tailEnd type="triangle"/>
+          </a:ln>
+        </p:spPr>
+        <p:style>
+          <a:lnRef idx="1">
+            <a:schemeClr val="accent1"/>
+          </a:lnRef>
+          <a:fillRef idx="0">
+            <a:schemeClr val="accent1"/>
+          </a:fillRef>
+          <a:effectRef idx="0">
+            <a:schemeClr val="accent1"/>
+          </a:effectRef>
+          <a:fontRef idx="minor">
+            <a:schemeClr val="tx1"/>
+          </a:fontRef>
+        </p:style>
+      </p:cxnSp>
+      <p:cxnSp>
+        <p:nvCxnSpPr>
+          <p:cNvPr id="31" name="Straight Connector 30">
+            <a:extLst>
+              <a:ext uri="{FF2B5EF4-FFF2-40B4-BE49-F238E27FC236}">
+                <a16:creationId xmlns:a16="http://schemas.microsoft.com/office/drawing/2014/main" id="{040F3802-7CA8-44D1-B856-C11C9F3E4899}"/>
+              </a:ext>
+            </a:extLst>
+          </p:cNvPr>
+          <p:cNvCxnSpPr>
+            <a:cxnSpLocks/>
+          </p:cNvCxnSpPr>
+          <p:nvPr/>
+        </p:nvCxnSpPr>
+        <p:spPr>
+          <a:xfrm>
+            <a:off x="5477439" y="1461247"/>
+            <a:ext cx="0" cy="2330823"/>
+          </a:xfrm>
+          <a:prstGeom prst="line">
+            <a:avLst/>
+          </a:prstGeom>
+        </p:spPr>
+        <p:style>
+          <a:lnRef idx="1">
+            <a:schemeClr val="accent1"/>
+          </a:lnRef>
+          <a:fillRef idx="0">
+            <a:schemeClr val="accent1"/>
+          </a:fillRef>
+          <a:effectRef idx="0">
+            <a:schemeClr val="accent1"/>
+          </a:effectRef>
+          <a:fontRef idx="minor">
+            <a:schemeClr val="tx1"/>
+          </a:fontRef>
+        </p:style>
+      </p:cxnSp>
+      <p:cxnSp>
+        <p:nvCxnSpPr>
+          <p:cNvPr id="35" name="Straight Arrow Connector 34">
+            <a:extLst>
+              <a:ext uri="{FF2B5EF4-FFF2-40B4-BE49-F238E27FC236}">
+                <a16:creationId xmlns:a16="http://schemas.microsoft.com/office/drawing/2014/main" id="{4EEB239A-4512-4194-A16E-878CC73C0007}"/>
+              </a:ext>
+            </a:extLst>
+          </p:cNvPr>
+          <p:cNvCxnSpPr>
+            <a:cxnSpLocks/>
+          </p:cNvCxnSpPr>
+          <p:nvPr/>
+        </p:nvCxnSpPr>
+        <p:spPr>
+          <a:xfrm>
+            <a:off x="5056096" y="1299880"/>
+            <a:ext cx="2580339" cy="0"/>
+          </a:xfrm>
+          <a:prstGeom prst="straightConnector1">
+            <a:avLst/>
+          </a:prstGeom>
+          <a:ln>
+            <a:tailEnd type="triangle"/>
+          </a:ln>
+        </p:spPr>
+        <p:style>
+          <a:lnRef idx="1">
+            <a:schemeClr val="accent1"/>
+          </a:lnRef>
+          <a:fillRef idx="0">
+            <a:schemeClr val="accent1"/>
+          </a:fillRef>
+          <a:effectRef idx="0">
+            <a:schemeClr val="accent1"/>
+          </a:effectRef>
+          <a:fontRef idx="minor">
+            <a:schemeClr val="tx1"/>
+          </a:fontRef>
+        </p:style>
+      </p:cxnSp>
+      <p:graphicFrame>
+        <p:nvGraphicFramePr>
+          <p:cNvPr id="14" name="Table 4">
+            <a:extLst>
+              <a:ext uri="{FF2B5EF4-FFF2-40B4-BE49-F238E27FC236}">
+                <a16:creationId xmlns:a16="http://schemas.microsoft.com/office/drawing/2014/main" id="{6B7908AB-B0D1-4A1E-94B7-E06A49048EB5}"/>
+              </a:ext>
+            </a:extLst>
+          </p:cNvPr>
+          <p:cNvGraphicFramePr>
+            <a:graphicFrameLocks noGrp="1"/>
+          </p:cNvGraphicFramePr>
+          <p:nvPr>
+            <p:extLst>
+              <p:ext uri="{D42A27DB-BD31-4B8C-83A1-F6EECF244321}">
+                <p14:modId xmlns:p14="http://schemas.microsoft.com/office/powerpoint/2010/main" val="3653805870"/>
+              </p:ext>
+            </p:extLst>
+          </p:nvPr>
+        </p:nvGraphicFramePr>
+        <p:xfrm>
+          <a:off x="5728450" y="3372966"/>
+          <a:ext cx="5012765" cy="3312160"/>
+        </p:xfrm>
+        <a:graphic>
+          <a:graphicData uri="http://schemas.openxmlformats.org/drawingml/2006/table">
+            <a:tbl>
+              <a:tblPr firstRow="1" bandRow="1">
+                <a:tableStyleId>{5C22544A-7EE6-4342-B048-85BDC9FD1C3A}</a:tableStyleId>
+              </a:tblPr>
+              <a:tblGrid>
+                <a:gridCol w="5012765">
+                  <a:extLst>
+                    <a:ext uri="{9D8B030D-6E8A-4147-A177-3AD203B41FA5}">
+                      <a16:colId xmlns:a16="http://schemas.microsoft.com/office/drawing/2014/main" val="1003031443"/>
+                    </a:ext>
+                  </a:extLst>
+                </a:gridCol>
+              </a:tblGrid>
+              <a:tr h="370840">
+                <a:tc>
+                  <a:txBody>
+                    <a:bodyPr/>
+                    <a:lstStyle/>
+                    <a:p>
+                      <a:r>
+                        <a:rPr lang="en-AU" dirty="0" err="1"/>
+                        <a:t>driver_vehicle</a:t>
+                      </a:r>
+                      <a:endParaRPr lang="en-AU" dirty="0"/>
+                    </a:p>
+                  </a:txBody>
+                  <a:tcPr/>
+                </a:tc>
+                <a:extLst>
+                  <a:ext uri="{0D108BD9-81ED-4DB2-BD59-A6C34878D82A}">
+                    <a16:rowId xmlns:a16="http://schemas.microsoft.com/office/drawing/2014/main" val="2026449852"/>
+                  </a:ext>
+                </a:extLst>
+              </a:tr>
+              <a:tr h="370840">
+                <a:tc>
+                  <a:txBody>
+                    <a:bodyPr/>
+                    <a:lstStyle/>
+                    <a:p>
+                      <a:pPr marL="0" marR="0" lvl="0" indent="0" algn="l" defTabSz="914400" rtl="0" eaLnBrk="1" fontAlgn="auto" latinLnBrk="0" hangingPunct="1">
+                        <a:lnSpc>
+                          <a:spcPct val="100000"/>
+                        </a:lnSpc>
+                        <a:spcBef>
+                          <a:spcPts val="0"/>
+                        </a:spcBef>
+                        <a:spcAft>
+                          <a:spcPts val="0"/>
+                        </a:spcAft>
+                        <a:buClrTx/>
+                        <a:buSzTx/>
+                        <a:buFontTx/>
+                        <a:buNone/>
+                        <a:tabLst/>
+                        <a:defRPr/>
+                      </a:pPr>
+                      <a:r>
+                        <a:rPr lang="es-ES" b="1" dirty="0" err="1"/>
+                        <a:t>Codi_expedient</a:t>
+                      </a:r>
+                      <a:endParaRPr lang="es-ES" b="1" dirty="0"/>
+                    </a:p>
+                  </a:txBody>
+                  <a:tcPr/>
+                </a:tc>
+                <a:extLst>
+                  <a:ext uri="{0D108BD9-81ED-4DB2-BD59-A6C34878D82A}">
+                    <a16:rowId xmlns:a16="http://schemas.microsoft.com/office/drawing/2014/main" val="3237917299"/>
+                  </a:ext>
+                </a:extLst>
+              </a:tr>
+              <a:tr h="303953">
+                <a:tc>
+                  <a:txBody>
+                    <a:bodyPr/>
+                    <a:lstStyle/>
+                    <a:p>
+                      <a:r>
+                        <a:rPr lang="es-ES" dirty="0" err="1"/>
+                        <a:t>unique_ident</a:t>
+                      </a:r>
+                      <a:r>
+                        <a:rPr lang="es-ES" dirty="0"/>
+                        <a:t> (</a:t>
+                      </a:r>
+                      <a:r>
+                        <a:rPr lang="es-ES" dirty="0" err="1"/>
+                        <a:t>to</a:t>
+                      </a:r>
+                      <a:r>
+                        <a:rPr lang="es-ES" dirty="0"/>
+                        <a:t> be </a:t>
+                      </a:r>
+                      <a:r>
+                        <a:rPr lang="es-ES" dirty="0" err="1"/>
+                        <a:t>derived</a:t>
+                      </a:r>
+                      <a:r>
+                        <a:rPr lang="es-ES" dirty="0"/>
+                        <a:t> </a:t>
+                      </a:r>
+                      <a:r>
+                        <a:rPr lang="es-ES" dirty="0" err="1"/>
+                        <a:t>from</a:t>
+                      </a:r>
+                      <a:r>
+                        <a:rPr lang="es-ES" dirty="0"/>
+                        <a:t> </a:t>
+                      </a:r>
+                      <a:r>
+                        <a:rPr lang="es-ES" dirty="0" err="1"/>
+                        <a:t>accident_ID</a:t>
+                      </a:r>
+                      <a:endParaRPr lang="es-ES" dirty="0"/>
+                    </a:p>
+                  </a:txBody>
+                  <a:tcPr/>
+                </a:tc>
+                <a:extLst>
+                  <a:ext uri="{0D108BD9-81ED-4DB2-BD59-A6C34878D82A}">
+                    <a16:rowId xmlns:a16="http://schemas.microsoft.com/office/drawing/2014/main" val="1184570764"/>
+                  </a:ext>
+                </a:extLst>
+              </a:tr>
+              <a:tr h="242147">
+                <a:tc>
+                  <a:txBody>
+                    <a:bodyPr/>
+                    <a:lstStyle/>
+                    <a:p>
+                      <a:pPr marL="0" marR="0" lvl="0" indent="0" algn="l" defTabSz="914400" rtl="0" eaLnBrk="1" fontAlgn="auto" latinLnBrk="0" hangingPunct="1">
+                        <a:lnSpc>
+                          <a:spcPct val="100000"/>
+                        </a:lnSpc>
+                        <a:spcBef>
+                          <a:spcPts val="0"/>
+                        </a:spcBef>
+                        <a:spcAft>
+                          <a:spcPts val="0"/>
+                        </a:spcAft>
+                        <a:buClrTx/>
+                        <a:buSzTx/>
+                        <a:buFontTx/>
+                        <a:buNone/>
+                        <a:tabLst/>
+                        <a:defRPr/>
+                      </a:pPr>
+                      <a:r>
+                        <a:rPr lang="es-ES" dirty="0" err="1"/>
+                        <a:t>vehicle_type</a:t>
+                      </a:r>
+                      <a:r>
+                        <a:rPr lang="es-ES" dirty="0"/>
+                        <a:t> (</a:t>
+                      </a:r>
+                      <a:r>
+                        <a:rPr lang="es-ES" dirty="0" err="1"/>
+                        <a:t>Descripcio_tipus_vehicle</a:t>
+                      </a:r>
+                      <a:r>
+                        <a:rPr lang="es-ES" dirty="0"/>
+                        <a:t>)</a:t>
+                      </a:r>
+                    </a:p>
+                  </a:txBody>
+                  <a:tcPr/>
+                </a:tc>
+                <a:extLst>
+                  <a:ext uri="{0D108BD9-81ED-4DB2-BD59-A6C34878D82A}">
+                    <a16:rowId xmlns:a16="http://schemas.microsoft.com/office/drawing/2014/main" val="3255982646"/>
+                  </a:ext>
+                </a:extLst>
+              </a:tr>
+              <a:tr h="180340">
+                <a:tc>
+                  <a:txBody>
+                    <a:bodyPr/>
+                    <a:lstStyle/>
+                    <a:p>
+                      <a:pPr marL="0" marR="0" lvl="0" indent="0" algn="l" defTabSz="914400" rtl="0" eaLnBrk="1" fontAlgn="auto" latinLnBrk="0" hangingPunct="1">
+                        <a:lnSpc>
+                          <a:spcPct val="100000"/>
+                        </a:lnSpc>
+                        <a:spcBef>
+                          <a:spcPts val="0"/>
+                        </a:spcBef>
+                        <a:spcAft>
+                          <a:spcPts val="0"/>
+                        </a:spcAft>
+                        <a:buClrTx/>
+                        <a:buSzTx/>
+                        <a:buFontTx/>
+                        <a:buNone/>
+                        <a:tabLst/>
+                        <a:defRPr/>
+                      </a:pPr>
+                      <a:r>
+                        <a:rPr lang="es-ES" dirty="0" err="1"/>
+                        <a:t>vehicle_model</a:t>
+                      </a:r>
+                      <a:r>
+                        <a:rPr lang="es-ES" dirty="0"/>
+                        <a:t> (</a:t>
+                      </a:r>
+                      <a:r>
+                        <a:rPr lang="es-ES" dirty="0" err="1"/>
+                        <a:t>Descripcio_model</a:t>
+                      </a:r>
+                      <a:r>
+                        <a:rPr lang="es-ES" dirty="0"/>
+                        <a:t>)</a:t>
+                      </a:r>
+                      <a:endParaRPr lang="en-AU" dirty="0"/>
+                    </a:p>
+                  </a:txBody>
+                  <a:tcPr/>
+                </a:tc>
+                <a:extLst>
+                  <a:ext uri="{0D108BD9-81ED-4DB2-BD59-A6C34878D82A}">
+                    <a16:rowId xmlns:a16="http://schemas.microsoft.com/office/drawing/2014/main" val="916570863"/>
+                  </a:ext>
+                </a:extLst>
+              </a:tr>
+              <a:tr h="118533">
+                <a:tc>
+                  <a:txBody>
+                    <a:bodyPr/>
+                    <a:lstStyle/>
+                    <a:p>
+                      <a:pPr marL="0" marR="0" lvl="0" indent="0" algn="l" defTabSz="914400" rtl="0" eaLnBrk="1" fontAlgn="auto" latinLnBrk="0" hangingPunct="1">
+                        <a:lnSpc>
+                          <a:spcPct val="100000"/>
+                        </a:lnSpc>
+                        <a:spcBef>
+                          <a:spcPts val="0"/>
+                        </a:spcBef>
+                        <a:spcAft>
+                          <a:spcPts val="0"/>
+                        </a:spcAft>
+                        <a:buClrTx/>
+                        <a:buSzTx/>
+                        <a:buFontTx/>
+                        <a:buNone/>
+                        <a:tabLst/>
+                        <a:defRPr/>
+                      </a:pPr>
+                      <a:r>
+                        <a:rPr lang="es-ES" dirty="0" err="1"/>
+                        <a:t>vehicle_manuf</a:t>
+                      </a:r>
+                      <a:r>
+                        <a:rPr lang="es-ES" dirty="0"/>
+                        <a:t> (</a:t>
+                      </a:r>
+                      <a:r>
+                        <a:rPr lang="es-ES" dirty="0" err="1"/>
+                        <a:t>Descripcio_marca</a:t>
+                      </a:r>
+                      <a:r>
+                        <a:rPr lang="es-ES" dirty="0"/>
+                        <a:t>)</a:t>
+                      </a:r>
+                      <a:endParaRPr lang="en-AU" dirty="0"/>
+                    </a:p>
+                  </a:txBody>
+                  <a:tcPr/>
+                </a:tc>
+                <a:extLst>
+                  <a:ext uri="{0D108BD9-81ED-4DB2-BD59-A6C34878D82A}">
+                    <a16:rowId xmlns:a16="http://schemas.microsoft.com/office/drawing/2014/main" val="2731069133"/>
+                  </a:ext>
+                </a:extLst>
+              </a:tr>
+              <a:tr h="0">
+                <a:tc>
+                  <a:txBody>
+                    <a:bodyPr/>
+                    <a:lstStyle/>
+                    <a:p>
+                      <a:pPr marL="0" marR="0" lvl="0" indent="0" algn="l" defTabSz="914400" rtl="0" eaLnBrk="1" fontAlgn="auto" latinLnBrk="0" hangingPunct="1">
+                        <a:lnSpc>
+                          <a:spcPct val="100000"/>
+                        </a:lnSpc>
+                        <a:spcBef>
+                          <a:spcPts val="0"/>
+                        </a:spcBef>
+                        <a:spcAft>
+                          <a:spcPts val="0"/>
+                        </a:spcAft>
+                        <a:buClrTx/>
+                        <a:buSzTx/>
+                        <a:buFontTx/>
+                        <a:buNone/>
+                        <a:tabLst/>
+                        <a:defRPr/>
+                      </a:pPr>
+                      <a:r>
+                        <a:rPr lang="es-ES" dirty="0" err="1"/>
+                        <a:t>vehicle_colour</a:t>
+                      </a:r>
+                      <a:r>
+                        <a:rPr lang="es-ES" dirty="0"/>
+                        <a:t> (</a:t>
+                      </a:r>
+                      <a:r>
+                        <a:rPr lang="es-ES" dirty="0" err="1"/>
+                        <a:t>Descripcio_color</a:t>
+                      </a:r>
+                      <a:r>
+                        <a:rPr lang="es-ES" dirty="0"/>
+                        <a:t>)</a:t>
+                      </a:r>
+                      <a:endParaRPr lang="en-AU" dirty="0"/>
+                    </a:p>
+                  </a:txBody>
+                  <a:tcPr/>
+                </a:tc>
+                <a:extLst>
+                  <a:ext uri="{0D108BD9-81ED-4DB2-BD59-A6C34878D82A}">
+                    <a16:rowId xmlns:a16="http://schemas.microsoft.com/office/drawing/2014/main" val="886884493"/>
+                  </a:ext>
+                </a:extLst>
+              </a:tr>
+              <a:tr h="370840">
+                <a:tc>
+                  <a:txBody>
+                    <a:bodyPr/>
+                    <a:lstStyle/>
+                    <a:p>
+                      <a:pPr marL="0" marR="0" lvl="0" indent="0" algn="l" defTabSz="914400" rtl="0" eaLnBrk="1" fontAlgn="auto" latinLnBrk="0" hangingPunct="1">
+                        <a:lnSpc>
+                          <a:spcPct val="100000"/>
+                        </a:lnSpc>
+                        <a:spcBef>
+                          <a:spcPts val="0"/>
+                        </a:spcBef>
+                        <a:spcAft>
+                          <a:spcPts val="0"/>
+                        </a:spcAft>
+                        <a:buClrTx/>
+                        <a:buSzTx/>
+                        <a:buFontTx/>
+                        <a:buNone/>
+                        <a:tabLst/>
+                        <a:defRPr/>
+                      </a:pPr>
+                      <a:r>
+                        <a:rPr lang="es-ES" dirty="0"/>
+                        <a:t>(</a:t>
+                      </a:r>
+                      <a:r>
+                        <a:rPr lang="en-AU" dirty="0" err="1"/>
+                        <a:t>license_type</a:t>
+                      </a:r>
+                      <a:r>
+                        <a:rPr lang="en-AU" dirty="0"/>
+                        <a:t> (</a:t>
+                      </a:r>
+                      <a:r>
+                        <a:rPr lang="en-AU" dirty="0" err="1"/>
+                        <a:t>Descripcio_carnet</a:t>
+                      </a:r>
+                      <a:r>
+                        <a:rPr lang="en-AU" dirty="0"/>
+                        <a:t>)</a:t>
+                      </a:r>
                     </a:p>
                   </a:txBody>
                   <a:tcPr/>
@@ -3914,7 +6288,22 @@
                     <a:bodyPr/>
                     <a:lstStyle/>
                     <a:p>
-                      <a:endParaRPr lang="en-AU" dirty="0"/>
+                      <a:r>
+                        <a:rPr lang="en-AU" dirty="0" err="1"/>
+                        <a:t>years_driving</a:t>
+                      </a:r>
+                      <a:r>
+                        <a:rPr lang="en-AU" dirty="0"/>
+                        <a:t> (</a:t>
+                      </a:r>
+                      <a:r>
+                        <a:rPr lang="en-AU" dirty="0" err="1"/>
+                        <a:t>Antiguitat_carnet</a:t>
+                      </a:r>
+                      <a:r>
+                        <a:rPr lang="en-AU" dirty="0"/>
+                        <a:t>)</a:t>
+                      </a:r>
                     </a:p>
                   </a:txBody>
                   <a:tcPr/>
@@ -3929,10 +6318,202 @@
           </a:graphicData>
         </a:graphic>
       </p:graphicFrame>
+      <p:cxnSp>
+        <p:nvCxnSpPr>
+          <p:cNvPr id="21" name="Straight Connector 20">
+            <a:extLst>
+              <a:ext uri="{FF2B5EF4-FFF2-40B4-BE49-F238E27FC236}">
+                <a16:creationId xmlns:a16="http://schemas.microsoft.com/office/drawing/2014/main" id="{EF996FF8-7A3C-49D7-8453-A625A092B14B}"/>
+              </a:ext>
+            </a:extLst>
+          </p:cNvPr>
+          <p:cNvCxnSpPr>
+            <a:cxnSpLocks/>
+          </p:cNvCxnSpPr>
+          <p:nvPr/>
+        </p:nvCxnSpPr>
+        <p:spPr>
+          <a:xfrm>
+            <a:off x="5047131" y="1461247"/>
+            <a:ext cx="430308" cy="0"/>
+          </a:xfrm>
+          <a:prstGeom prst="line">
+            <a:avLst/>
+          </a:prstGeom>
+        </p:spPr>
+        <p:style>
+          <a:lnRef idx="1">
+            <a:schemeClr val="accent1"/>
+          </a:lnRef>
+          <a:fillRef idx="0">
+            <a:schemeClr val="accent1"/>
+          </a:fillRef>
+          <a:effectRef idx="0">
+            <a:schemeClr val="accent1"/>
+          </a:effectRef>
+          <a:fontRef idx="minor">
+            <a:schemeClr val="tx1"/>
+          </a:fontRef>
+        </p:style>
+      </p:cxnSp>
+      <p:cxnSp>
+        <p:nvCxnSpPr>
+          <p:cNvPr id="30" name="Straight Connector 29">
+            <a:extLst>
+              <a:ext uri="{FF2B5EF4-FFF2-40B4-BE49-F238E27FC236}">
+                <a16:creationId xmlns:a16="http://schemas.microsoft.com/office/drawing/2014/main" id="{EB068EC6-5E4F-4C49-A927-F07465979729}"/>
+              </a:ext>
+            </a:extLst>
+          </p:cNvPr>
+          <p:cNvCxnSpPr/>
+          <p:nvPr/>
+        </p:nvCxnSpPr>
+        <p:spPr>
+          <a:xfrm>
+            <a:off x="5047131" y="1775012"/>
+            <a:ext cx="215154" cy="0"/>
+          </a:xfrm>
+          <a:prstGeom prst="line">
+            <a:avLst/>
+          </a:prstGeom>
+        </p:spPr>
+        <p:style>
+          <a:lnRef idx="1">
+            <a:schemeClr val="accent1"/>
+          </a:lnRef>
+          <a:fillRef idx="0">
+            <a:schemeClr val="accent1"/>
+          </a:fillRef>
+          <a:effectRef idx="0">
+            <a:schemeClr val="accent1"/>
+          </a:effectRef>
+          <a:fontRef idx="minor">
+            <a:schemeClr val="tx1"/>
+          </a:fontRef>
+        </p:style>
+      </p:cxnSp>
+      <p:cxnSp>
+        <p:nvCxnSpPr>
+          <p:cNvPr id="36" name="Straight Connector 35">
+            <a:extLst>
+              <a:ext uri="{FF2B5EF4-FFF2-40B4-BE49-F238E27FC236}">
+                <a16:creationId xmlns:a16="http://schemas.microsoft.com/office/drawing/2014/main" id="{CD58CE60-2D3C-4633-9C35-A2FBFCA4016B}"/>
+              </a:ext>
+            </a:extLst>
+          </p:cNvPr>
+          <p:cNvCxnSpPr>
+            <a:cxnSpLocks/>
+          </p:cNvCxnSpPr>
+          <p:nvPr/>
+        </p:nvCxnSpPr>
+        <p:spPr>
+          <a:xfrm>
+            <a:off x="5262285" y="1775012"/>
+            <a:ext cx="0" cy="1201272"/>
+          </a:xfrm>
+          <a:prstGeom prst="line">
+            <a:avLst/>
+          </a:prstGeom>
+        </p:spPr>
+        <p:style>
+          <a:lnRef idx="1">
+            <a:schemeClr val="accent1"/>
+          </a:lnRef>
+          <a:fillRef idx="0">
+            <a:schemeClr val="accent1"/>
+          </a:fillRef>
+          <a:effectRef idx="0">
+            <a:schemeClr val="accent1"/>
+          </a:effectRef>
+          <a:fontRef idx="minor">
+            <a:schemeClr val="tx1"/>
+          </a:fontRef>
+        </p:style>
+      </p:cxnSp>
+      <p:cxnSp>
+        <p:nvCxnSpPr>
+          <p:cNvPr id="38" name="Straight Arrow Connector 37">
+            <a:extLst>
+              <a:ext uri="{FF2B5EF4-FFF2-40B4-BE49-F238E27FC236}">
+                <a16:creationId xmlns:a16="http://schemas.microsoft.com/office/drawing/2014/main" id="{47CB903D-7546-4608-ABD4-4B176A6C430A}"/>
+              </a:ext>
+            </a:extLst>
+          </p:cNvPr>
+          <p:cNvCxnSpPr>
+            <a:cxnSpLocks/>
+          </p:cNvCxnSpPr>
+          <p:nvPr/>
+        </p:nvCxnSpPr>
+        <p:spPr>
+          <a:xfrm flipH="1">
+            <a:off x="4482354" y="2976284"/>
+            <a:ext cx="779931" cy="0"/>
+          </a:xfrm>
+          <a:prstGeom prst="straightConnector1">
+            <a:avLst/>
+          </a:prstGeom>
+          <a:ln>
+            <a:tailEnd type="triangle"/>
+          </a:ln>
+        </p:spPr>
+        <p:style>
+          <a:lnRef idx="1">
+            <a:schemeClr val="accent1"/>
+          </a:lnRef>
+          <a:fillRef idx="0">
+            <a:schemeClr val="accent1"/>
+          </a:fillRef>
+          <a:effectRef idx="0">
+            <a:schemeClr val="accent1"/>
+          </a:effectRef>
+          <a:fontRef idx="minor">
+            <a:schemeClr val="tx1"/>
+          </a:fontRef>
+        </p:style>
+      </p:cxnSp>
+      <p:sp>
+        <p:nvSpPr>
+          <p:cNvPr id="41" name="TextBox 40">
+            <a:extLst>
+              <a:ext uri="{FF2B5EF4-FFF2-40B4-BE49-F238E27FC236}">
+                <a16:creationId xmlns:a16="http://schemas.microsoft.com/office/drawing/2014/main" id="{D5BE48D1-A926-4EF7-A0D4-F5CE1F5BC181}"/>
+              </a:ext>
+            </a:extLst>
+          </p:cNvPr>
+          <p:cNvSpPr txBox="1"/>
+          <p:nvPr/>
+        </p:nvSpPr>
+        <p:spPr>
+          <a:xfrm>
+            <a:off x="3585883" y="20420"/>
+            <a:ext cx="4247958" cy="646331"/>
+          </a:xfrm>
+          <a:prstGeom prst="rect">
+            <a:avLst/>
+          </a:prstGeom>
+          <a:noFill/>
+        </p:spPr>
+        <p:txBody>
+          <a:bodyPr wrap="none" rtlCol="0">
+            <a:spAutoFit/>
+          </a:bodyPr>
+          <a:lstStyle/>
+          <a:p>
+            <a:r>
+              <a:rPr lang="en-AU" sz="3600" dirty="0">
+                <a:solidFill>
+                  <a:srgbClr val="4472C4"/>
+                </a:solidFill>
+              </a:rPr>
+              <a:t>Future Improvements</a:t>
+            </a:r>
+          </a:p>
+        </p:txBody>
+      </p:sp>
     </p:spTree>
     <p:extLst>
       <p:ext uri="{BB962C8B-B14F-4D97-AF65-F5344CB8AC3E}">
-        <p14:creationId xmlns:p14="http://schemas.microsoft.com/office/powerpoint/2010/main" val="1083540183"/>
+        <p14:creationId xmlns:p14="http://schemas.microsoft.com/office/powerpoint/2010/main" val="2743364774"/>
       </p:ext>
     </p:extLst>
   </p:cSld>

</xml_diff>

<commit_message>
cleaned file structre and also prepped the final IPYNB and SQL files
</commit_message>
<xml_diff>
--- a/your-project/ERD - in progress.pptx
+++ b/your-project/ERD - in progress.pptx
@@ -3363,14 +3363,14 @@
           <p:nvPr>
             <p:extLst>
               <p:ext uri="{D42A27DB-BD31-4B8C-83A1-F6EECF244321}">
-                <p14:modId xmlns:p14="http://schemas.microsoft.com/office/powerpoint/2010/main" val="3914252717"/>
+                <p14:modId xmlns:p14="http://schemas.microsoft.com/office/powerpoint/2010/main" val="1941865494"/>
               </p:ext>
             </p:extLst>
           </p:nvPr>
         </p:nvGraphicFramePr>
         <p:xfrm>
-          <a:off x="7234519" y="4200508"/>
-          <a:ext cx="3104776" cy="1854200"/>
+          <a:off x="7234519" y="4200510"/>
+          <a:ext cx="3104776" cy="1864114"/>
         </p:xfrm>
         <a:graphic>
           <a:graphicData uri="http://schemas.openxmlformats.org/drawingml/2006/table">
@@ -3387,7 +3387,7 @@
                   </a:extLst>
                 </a:gridCol>
               </a:tblGrid>
-              <a:tr h="370840">
+              <a:tr h="328779">
                 <a:tc>
                   <a:txBody>
                     <a:bodyPr/>
@@ -3407,29 +3407,45 @@
                   </a:ext>
                 </a:extLst>
               </a:tr>
-              <a:tr h="370840">
+              <a:tr h="328779">
                 <a:tc>
                   <a:txBody>
                     <a:bodyPr/>
                     <a:lstStyle/>
                     <a:p>
+                      <a:pPr marL="0" marR="0" lvl="0" indent="0" algn="l" defTabSz="914400" rtl="0" eaLnBrk="1" fontAlgn="auto" latinLnBrk="0" hangingPunct="1">
+                        <a:lnSpc>
+                          <a:spcPct val="100000"/>
+                        </a:lnSpc>
+                        <a:spcBef>
+                          <a:spcPts val="0"/>
+                        </a:spcBef>
+                        <a:spcAft>
+                          <a:spcPts val="0"/>
+                        </a:spcAft>
+                        <a:buClrTx/>
+                        <a:buSzTx/>
+                        <a:buFontTx/>
+                        <a:buNone/>
+                        <a:tabLst/>
+                        <a:defRPr/>
+                      </a:pPr>
                       <a:r>
                         <a:rPr lang="en-AU" b="1" dirty="0" err="1"/>
-                        <a:t>Street_ID</a:t>
+                        <a:t>accident_id</a:t>
                       </a:r>
                       <a:r>
                         <a:rPr lang="en-AU" b="1" dirty="0"/>
                         <a:t> (</a:t>
                       </a:r>
                       <a:r>
-                        <a:rPr lang="fr-FR" b="1" dirty="0" err="1"/>
-                        <a:t>Codi_carrer</a:t>
-                      </a:r>
-                      <a:r>
-                        <a:rPr lang="fr-FR" b="1" dirty="0"/>
+                        <a:rPr lang="en-AU" b="1" dirty="0" err="1"/>
+                        <a:t>Codi_expedient</a:t>
+                      </a:r>
+                      <a:r>
+                        <a:rPr lang="en-AU" b="1" dirty="0"/>
                         <a:t>)</a:t>
                       </a:r>
-                      <a:endParaRPr lang="en-AU" b="1" dirty="0"/>
                     </a:p>
                   </a:txBody>
                   <a:tcPr/>
@@ -3440,12 +3456,29 @@
                   </a:ext>
                 </a:extLst>
               </a:tr>
-              <a:tr h="370840">
+              <a:tr h="328779">
                 <a:tc>
                   <a:txBody>
                     <a:bodyPr/>
                     <a:lstStyle/>
                     <a:p>
+                      <a:pPr marL="0" marR="0" lvl="0" indent="0" algn="l" defTabSz="914400" rtl="0" eaLnBrk="1" fontAlgn="auto" latinLnBrk="0" hangingPunct="1">
+                        <a:lnSpc>
+                          <a:spcPct val="100000"/>
+                        </a:lnSpc>
+                        <a:spcBef>
+                          <a:spcPts val="0"/>
+                        </a:spcBef>
+                        <a:spcAft>
+                          <a:spcPts val="0"/>
+                        </a:spcAft>
+                        <a:buClrTx/>
+                        <a:buSzTx/>
+                        <a:buFontTx/>
+                        <a:buNone/>
+                        <a:tabLst/>
+                        <a:defRPr/>
+                      </a:pPr>
                       <a:r>
                         <a:rPr lang="en-AU" dirty="0" err="1"/>
                         <a:t>street_name</a:t>
@@ -3457,6 +3490,56 @@
                       <a:r>
                         <a:rPr lang="en-AU" dirty="0" err="1"/>
                         <a:t>Nom_carrer</a:t>
+                      </a:r>
+                      <a:r>
+                        <a:rPr lang="en-AU" dirty="0"/>
+                        <a:t>)</a:t>
+                      </a:r>
+                      <a:endParaRPr lang="en-AU" b="0" dirty="0"/>
+                    </a:p>
+                  </a:txBody>
+                  <a:tcPr/>
+                </a:tc>
+                <a:extLst>
+                  <a:ext uri="{0D108BD9-81ED-4DB2-BD59-A6C34878D82A}">
+                    <a16:rowId xmlns:a16="http://schemas.microsoft.com/office/drawing/2014/main" val="1672368474"/>
+                  </a:ext>
+                </a:extLst>
+              </a:tr>
+              <a:tr h="328779">
+                <a:tc>
+                  <a:txBody>
+                    <a:bodyPr/>
+                    <a:lstStyle/>
+                    <a:p>
+                      <a:pPr marL="0" marR="0" lvl="0" indent="0" algn="l" defTabSz="914400" rtl="0" eaLnBrk="1" fontAlgn="auto" latinLnBrk="0" hangingPunct="1">
+                        <a:lnSpc>
+                          <a:spcPct val="100000"/>
+                        </a:lnSpc>
+                        <a:spcBef>
+                          <a:spcPts val="0"/>
+                        </a:spcBef>
+                        <a:spcAft>
+                          <a:spcPts val="0"/>
+                        </a:spcAft>
+                        <a:buClrTx/>
+                        <a:buSzTx/>
+                        <a:buFontTx/>
+                        <a:buNone/>
+                        <a:tabLst/>
+                        <a:defRPr/>
+                      </a:pPr>
+                      <a:r>
+                        <a:rPr lang="en-AU" dirty="0" err="1"/>
+                        <a:t>suburb_name</a:t>
+                      </a:r>
+                      <a:r>
+                        <a:rPr lang="en-AU" dirty="0"/>
+                        <a:t> (</a:t>
+                      </a:r>
+                      <a:r>
+                        <a:rPr lang="en-AU" dirty="0" err="1"/>
+                        <a:t>Nom_barri</a:t>
                       </a:r>
                       <a:r>
                         <a:rPr lang="en-AU" dirty="0"/>
@@ -3472,15 +3555,32 @@
                   </a:ext>
                 </a:extLst>
               </a:tr>
-              <a:tr h="370840">
+              <a:tr h="401074">
                 <a:tc>
                   <a:txBody>
                     <a:bodyPr/>
                     <a:lstStyle/>
                     <a:p>
+                      <a:pPr marL="0" marR="0" lvl="0" indent="0" algn="l" defTabSz="914400" rtl="0" eaLnBrk="1" fontAlgn="auto" latinLnBrk="0" hangingPunct="1">
+                        <a:lnSpc>
+                          <a:spcPct val="100000"/>
+                        </a:lnSpc>
+                        <a:spcBef>
+                          <a:spcPts val="0"/>
+                        </a:spcBef>
+                        <a:spcAft>
+                          <a:spcPts val="0"/>
+                        </a:spcAft>
+                        <a:buClrTx/>
+                        <a:buSzTx/>
+                        <a:buFontTx/>
+                        <a:buNone/>
+                        <a:tabLst/>
+                        <a:defRPr/>
+                      </a:pPr>
                       <a:r>
                         <a:rPr lang="en-AU" dirty="0" err="1"/>
-                        <a:t>suburb_name</a:t>
+                        <a:t>district_name</a:t>
                       </a:r>
                       <a:r>
                         <a:rPr lang="en-AU" dirty="0"/>
@@ -3488,7 +3588,7 @@
                       </a:r>
                       <a:r>
                         <a:rPr lang="en-AU" dirty="0" err="1"/>
-                        <a:t>Nom_barri</a:t>
+                        <a:t>Nom_districte</a:t>
                       </a:r>
                       <a:r>
                         <a:rPr lang="en-AU" dirty="0"/>
@@ -3504,38 +3604,6 @@
                   </a:ext>
                 </a:extLst>
               </a:tr>
-              <a:tr h="370840">
-                <a:tc>
-                  <a:txBody>
-                    <a:bodyPr/>
-                    <a:lstStyle/>
-                    <a:p>
-                      <a:r>
-                        <a:rPr lang="en-AU" dirty="0" err="1"/>
-                        <a:t>district_name</a:t>
-                      </a:r>
-                      <a:r>
-                        <a:rPr lang="en-AU" dirty="0"/>
-                        <a:t> (</a:t>
-                      </a:r>
-                      <a:r>
-                        <a:rPr lang="en-AU" dirty="0" err="1"/>
-                        <a:t>Nom_districte</a:t>
-                      </a:r>
-                      <a:r>
-                        <a:rPr lang="en-AU" dirty="0"/>
-                        <a:t>)</a:t>
-                      </a:r>
-                    </a:p>
-                  </a:txBody>
-                  <a:tcPr/>
-                </a:tc>
-                <a:extLst>
-                  <a:ext uri="{0D108BD9-81ED-4DB2-BD59-A6C34878D82A}">
-                    <a16:rowId xmlns:a16="http://schemas.microsoft.com/office/drawing/2014/main" val="3257835866"/>
-                  </a:ext>
-                </a:extLst>
-              </a:tr>
             </a:tbl>
           </a:graphicData>
         </a:graphic>
@@ -3555,7 +3623,7 @@
           <p:nvPr>
             <p:extLst>
               <p:ext uri="{D42A27DB-BD31-4B8C-83A1-F6EECF244321}">
-                <p14:modId xmlns:p14="http://schemas.microsoft.com/office/powerpoint/2010/main" val="3272351239"/>
+                <p14:modId xmlns:p14="http://schemas.microsoft.com/office/powerpoint/2010/main" val="3262301578"/>
               </p:ext>
             </p:extLst>
           </p:nvPr>
@@ -3682,7 +3750,7 @@
                       </a:r>
                       <a:r>
                         <a:rPr lang="es-ES" dirty="0" err="1"/>
-                        <a:t>Hoa_dia</a:t>
+                        <a:t>Hora_dia</a:t>
                       </a:r>
                       <a:r>
                         <a:rPr lang="es-ES" dirty="0"/>

</xml_diff>